<commit_message>
Fri Dec  2 22:16:10 EST 2016
</commit_message>
<xml_diff>
--- a/docs/Small Task Computer.pptx
+++ b/docs/Small Task Computer.pptx
@@ -10,40 +10,40 @@
   </p:notesMasterIdLst>
   <p:sldIdLst>
     <p:sldId id="256" r:id="rId3"/>
-    <p:sldId id="257" r:id="rId4"/>
-    <p:sldId id="258" r:id="rId5"/>
-    <p:sldId id="259" r:id="rId6"/>
-    <p:sldId id="260" r:id="rId7"/>
-    <p:sldId id="261" r:id="rId8"/>
-    <p:sldId id="262" r:id="rId9"/>
-    <p:sldId id="263" r:id="rId10"/>
-    <p:sldId id="264" r:id="rId11"/>
-    <p:sldId id="265" r:id="rId12"/>
-    <p:sldId id="266" r:id="rId13"/>
-    <p:sldId id="267" r:id="rId14"/>
-    <p:sldId id="268" r:id="rId15"/>
-    <p:sldId id="269" r:id="rId16"/>
-    <p:sldId id="270" r:id="rId17"/>
-    <p:sldId id="271" r:id="rId18"/>
-    <p:sldId id="272" r:id="rId19"/>
-    <p:sldId id="273" r:id="rId20"/>
-    <p:sldId id="274" r:id="rId21"/>
-    <p:sldId id="275" r:id="rId22"/>
-    <p:sldId id="276" r:id="rId23"/>
-    <p:sldId id="277" r:id="rId24"/>
-    <p:sldId id="278" r:id="rId25"/>
-    <p:sldId id="279" r:id="rId26"/>
+    <p:sldId id="279" r:id="rId4"/>
+    <p:sldId id="257" r:id="rId5"/>
+    <p:sldId id="258" r:id="rId6"/>
+    <p:sldId id="259" r:id="rId7"/>
+    <p:sldId id="260" r:id="rId8"/>
+    <p:sldId id="261" r:id="rId9"/>
+    <p:sldId id="262" r:id="rId10"/>
+    <p:sldId id="263" r:id="rId11"/>
+    <p:sldId id="264" r:id="rId12"/>
+    <p:sldId id="265" r:id="rId13"/>
+    <p:sldId id="266" r:id="rId14"/>
+    <p:sldId id="267" r:id="rId15"/>
+    <p:sldId id="268" r:id="rId16"/>
+    <p:sldId id="269" r:id="rId17"/>
+    <p:sldId id="270" r:id="rId18"/>
+    <p:sldId id="271" r:id="rId19"/>
+    <p:sldId id="272" r:id="rId20"/>
+    <p:sldId id="273" r:id="rId21"/>
+    <p:sldId id="274" r:id="rId22"/>
+    <p:sldId id="275" r:id="rId23"/>
+    <p:sldId id="276" r:id="rId24"/>
+    <p:sldId id="277" r:id="rId25"/>
+    <p:sldId id="278" r:id="rId26"/>
   </p:sldIdLst>
   <p:sldSz cx="9144000" cy="5143500" type="screen16x9"/>
   <p:notesSz cx="6858000" cy="9144000"/>
   <p:embeddedFontLst>
     <p:embeddedFont>
-      <p:font typeface="Montserrat" panose="020B0604020202020204" charset="0"/>
+      <p:font typeface="Oswald" panose="020B0604020202020204" charset="0"/>
       <p:regular r:id="rId28"/>
       <p:bold r:id="rId29"/>
     </p:embeddedFont>
     <p:embeddedFont>
-      <p:font typeface="Oswald" panose="020B0604020202020204" charset="0"/>
+      <p:font typeface="Montserrat" panose="020B0604020202020204" charset="0"/>
       <p:regular r:id="rId30"/>
       <p:bold r:id="rId31"/>
     </p:embeddedFont>
@@ -12841,6 +12841,321 @@
   <p:cSld>
     <p:spTree>
       <p:nvGrpSpPr>
+        <p:cNvPr id="1" name="Shape 169"/>
+        <p:cNvGrpSpPr/>
+        <p:nvPr/>
+      </p:nvGrpSpPr>
+      <p:grpSpPr>
+        <a:xfrm>
+          <a:off x="0" y="0"/>
+          <a:ext cx="0" cy="0"/>
+          <a:chOff x="0" y="0"/>
+          <a:chExt cx="0" cy="0"/>
+        </a:xfrm>
+      </p:grpSpPr>
+      <p:sp>
+        <p:nvSpPr>
+          <p:cNvPr id="170" name="Shape 170"/>
+          <p:cNvSpPr txBox="1">
+            <a:spLocks noGrp="1"/>
+          </p:cNvSpPr>
+          <p:nvPr>
+            <p:ph type="title"/>
+          </p:nvPr>
+        </p:nvSpPr>
+        <p:spPr>
+          <a:xfrm>
+            <a:off x="311700" y="445025"/>
+            <a:ext cx="8520599" cy="572699"/>
+          </a:xfrm>
+          <a:prstGeom prst="rect">
+            <a:avLst/>
+          </a:prstGeom>
+          <a:noFill/>
+          <a:ln>
+            <a:noFill/>
+          </a:ln>
+        </p:spPr>
+        <p:txBody>
+          <a:bodyPr lIns="91425" tIns="91425" rIns="91425" bIns="91425" anchor="t" anchorCtr="0">
+            <a:noAutofit/>
+          </a:bodyPr>
+          <a:lstStyle/>
+          <a:p>
+            <a:pPr marL="0" marR="0" lvl="0" indent="0" algn="ctr" rtl="0">
+              <a:lnSpc>
+                <a:spcPct val="100000"/>
+              </a:lnSpc>
+              <a:spcBef>
+                <a:spcPts val="0"/>
+              </a:spcBef>
+              <a:spcAft>
+                <a:spcPts val="0"/>
+              </a:spcAft>
+              <a:buClr>
+                <a:schemeClr val="dk2"/>
+              </a:buClr>
+              <a:buSzPct val="25000"/>
+              <a:buFont typeface="Oswald"/>
+              <a:buNone/>
+            </a:pPr>
+            <a:r>
+              <a:rPr lang="en">
+                <a:solidFill>
+                  <a:srgbClr val="4A86E8"/>
+                </a:solidFill>
+              </a:rPr>
+              <a:t>Reuse Raspberry PI2 Enclosure</a:t>
+            </a:r>
+          </a:p>
+          <a:p>
+            <a:pPr marL="0" marR="0" lvl="0" indent="0" algn="ctr" rtl="0">
+              <a:lnSpc>
+                <a:spcPct val="100000"/>
+              </a:lnSpc>
+              <a:spcBef>
+                <a:spcPts val="0"/>
+              </a:spcBef>
+              <a:spcAft>
+                <a:spcPts val="0"/>
+              </a:spcAft>
+              <a:buClr>
+                <a:schemeClr val="dk2"/>
+              </a:buClr>
+              <a:buSzPct val="25000"/>
+              <a:buFont typeface="Oswald"/>
+              <a:buNone/>
+            </a:pPr>
+            <a:endParaRPr sz="3000" b="0" i="0" u="none" strike="noStrike" cap="none">
+              <a:solidFill>
+                <a:schemeClr val="dk2"/>
+              </a:solidFill>
+              <a:latin typeface="Oswald"/>
+              <a:ea typeface="Oswald"/>
+              <a:cs typeface="Oswald"/>
+              <a:sym typeface="Oswald"/>
+            </a:endParaRPr>
+          </a:p>
+        </p:txBody>
+      </p:sp>
+      <p:sp>
+        <p:nvSpPr>
+          <p:cNvPr id="171" name="Shape 171"/>
+          <p:cNvSpPr txBox="1">
+            <a:spLocks noGrp="1"/>
+          </p:cNvSpPr>
+          <p:nvPr>
+            <p:ph type="body" idx="1"/>
+          </p:nvPr>
+        </p:nvSpPr>
+        <p:spPr>
+          <a:xfrm>
+            <a:off x="311700" y="1017725"/>
+            <a:ext cx="8520600" cy="4060200"/>
+          </a:xfrm>
+          <a:prstGeom prst="rect">
+            <a:avLst/>
+          </a:prstGeom>
+          <a:noFill/>
+          <a:ln>
+            <a:noFill/>
+          </a:ln>
+        </p:spPr>
+        <p:txBody>
+          <a:bodyPr lIns="91425" tIns="91425" rIns="91425" bIns="91425" anchor="t" anchorCtr="0">
+            <a:noAutofit/>
+          </a:bodyPr>
+          <a:lstStyle/>
+          <a:p>
+            <a:pPr marL="457200" marR="0" lvl="0" indent="-228600" algn="l" rtl="0">
+              <a:lnSpc>
+                <a:spcPct val="115000"/>
+              </a:lnSpc>
+              <a:spcBef>
+                <a:spcPts val="0"/>
+              </a:spcBef>
+              <a:spcAft>
+                <a:spcPts val="0"/>
+              </a:spcAft>
+              <a:buClr>
+                <a:schemeClr val="dk2"/>
+              </a:buClr>
+              <a:buSzPct val="100000"/>
+              <a:buFont typeface="Playfair Display"/>
+              <a:buAutoNum type="alphaUcPeriod"/>
+            </a:pPr>
+            <a:r>
+              <a:rPr lang="en"/>
+              <a:t> Credit card size board just like raspberry PI, it may be accommodated in raspberry PI enclosure.</a:t>
+            </a:r>
+          </a:p>
+        </p:txBody>
+      </p:sp>
+      <p:pic>
+        <p:nvPicPr>
+          <p:cNvPr id="172" name="Shape 172" descr="board1.jpg"/>
+          <p:cNvPicPr preferRelativeResize="0"/>
+          <p:nvPr/>
+        </p:nvPicPr>
+        <p:blipFill>
+          <a:blip r:embed="rId3">
+            <a:alphaModFix/>
+          </a:blip>
+          <a:stretch>
+            <a:fillRect/>
+          </a:stretch>
+        </p:blipFill>
+        <p:spPr>
+          <a:xfrm>
+            <a:off x="543850" y="1753749"/>
+            <a:ext cx="4764303" cy="3158700"/>
+          </a:xfrm>
+          <a:prstGeom prst="rect">
+            <a:avLst/>
+          </a:prstGeom>
+          <a:noFill/>
+          <a:ln w="19050" cap="flat" cmpd="sng">
+            <a:solidFill>
+              <a:schemeClr val="dk2"/>
+            </a:solidFill>
+            <a:prstDash val="solid"/>
+            <a:round/>
+            <a:headEnd type="none" w="med" len="med"/>
+            <a:tailEnd type="none" w="med" len="med"/>
+          </a:ln>
+        </p:spPr>
+      </p:pic>
+      <p:pic>
+        <p:nvPicPr>
+          <p:cNvPr id="173" name="Shape 173" descr="board2.jpg"/>
+          <p:cNvPicPr preferRelativeResize="0"/>
+          <p:nvPr/>
+        </p:nvPicPr>
+        <p:blipFill>
+          <a:blip r:embed="rId4">
+            <a:alphaModFix/>
+          </a:blip>
+          <a:stretch>
+            <a:fillRect/>
+          </a:stretch>
+        </p:blipFill>
+        <p:spPr>
+          <a:xfrm>
+            <a:off x="5956575" y="1753750"/>
+            <a:ext cx="2596522" cy="1250624"/>
+          </a:xfrm>
+          <a:prstGeom prst="rect">
+            <a:avLst/>
+          </a:prstGeom>
+          <a:noFill/>
+          <a:ln w="19050" cap="flat" cmpd="sng">
+            <a:solidFill>
+              <a:schemeClr val="dk2"/>
+            </a:solidFill>
+            <a:prstDash val="solid"/>
+            <a:round/>
+            <a:headEnd type="none" w="med" len="med"/>
+            <a:tailEnd type="none" w="med" len="med"/>
+          </a:ln>
+        </p:spPr>
+      </p:pic>
+      <p:sp>
+        <p:nvSpPr>
+          <p:cNvPr id="174" name="Shape 174"/>
+          <p:cNvSpPr txBox="1"/>
+          <p:nvPr/>
+        </p:nvSpPr>
+        <p:spPr>
+          <a:xfrm>
+            <a:off x="6503762" y="4339750"/>
+            <a:ext cx="1751400" cy="572700"/>
+          </a:xfrm>
+          <a:prstGeom prst="rect">
+            <a:avLst/>
+          </a:prstGeom>
+          <a:noFill/>
+          <a:ln>
+            <a:noFill/>
+          </a:ln>
+        </p:spPr>
+        <p:txBody>
+          <a:bodyPr lIns="91425" tIns="91425" rIns="91425" bIns="91425" anchor="t" anchorCtr="0">
+            <a:noAutofit/>
+          </a:bodyPr>
+          <a:lstStyle/>
+          <a:p>
+            <a:pPr lvl="0">
+              <a:spcBef>
+                <a:spcPts val="0"/>
+              </a:spcBef>
+              <a:buNone/>
+            </a:pPr>
+            <a:r>
+              <a:rPr lang="en"/>
+              <a:t>Similar size as Raspberry PI 2/3</a:t>
+            </a:r>
+          </a:p>
+        </p:txBody>
+      </p:sp>
+      <p:sp>
+        <p:nvSpPr>
+          <p:cNvPr id="175" name="Shape 175"/>
+          <p:cNvSpPr/>
+          <p:nvPr/>
+        </p:nvSpPr>
+        <p:spPr>
+          <a:xfrm>
+            <a:off x="7110987" y="3454375"/>
+            <a:ext cx="287700" cy="818700"/>
+          </a:xfrm>
+          <a:prstGeom prst="upArrow">
+            <a:avLst>
+              <a:gd name="adj1" fmla="val 50000"/>
+              <a:gd name="adj2" fmla="val 50000"/>
+            </a:avLst>
+          </a:prstGeom>
+          <a:solidFill>
+            <a:schemeClr val="lt2"/>
+          </a:solidFill>
+          <a:ln w="9525" cap="flat" cmpd="sng">
+            <a:solidFill>
+              <a:schemeClr val="dk2"/>
+            </a:solidFill>
+            <a:prstDash val="solid"/>
+            <a:round/>
+            <a:headEnd type="none" w="med" len="med"/>
+            <a:tailEnd type="none" w="med" len="med"/>
+          </a:ln>
+        </p:spPr>
+        <p:txBody>
+          <a:bodyPr lIns="91425" tIns="91425" rIns="91425" bIns="91425" anchor="ctr" anchorCtr="0">
+            <a:noAutofit/>
+          </a:bodyPr>
+          <a:lstStyle/>
+          <a:p>
+            <a:pPr lvl="0">
+              <a:spcBef>
+                <a:spcPts val="0"/>
+              </a:spcBef>
+              <a:buNone/>
+            </a:pPr>
+            <a:endParaRPr/>
+          </a:p>
+        </p:txBody>
+      </p:sp>
+    </p:spTree>
+  </p:cSld>
+  <p:clrMapOvr>
+    <a:masterClrMapping/>
+  </p:clrMapOvr>
+</p:sld>
+</file>
+
+<file path=ppt/slides/slide11.xml><?xml version="1.0" encoding="utf-8"?>
+<p:sld xmlns:a="http://schemas.openxmlformats.org/drawingml/2006/main" xmlns:r="http://schemas.openxmlformats.org/officeDocument/2006/relationships" xmlns:p="http://schemas.openxmlformats.org/presentationml/2006/main">
+  <p:cSld>
+    <p:spTree>
+      <p:nvGrpSpPr>
         <p:cNvPr id="1" name="Shape 179"/>
         <p:cNvGrpSpPr/>
         <p:nvPr/>
@@ -14519,7 +14834,7 @@
 </p:sld>
 </file>
 
-<file path=ppt/slides/slide11.xml><?xml version="1.0" encoding="utf-8"?>
+<file path=ppt/slides/slide12.xml><?xml version="1.0" encoding="utf-8"?>
 <p:sld xmlns:a="http://schemas.openxmlformats.org/drawingml/2006/main" xmlns:r="http://schemas.openxmlformats.org/officeDocument/2006/relationships" xmlns:p="http://schemas.openxmlformats.org/presentationml/2006/main">
   <p:cSld>
     <p:spTree>
@@ -14705,7 +15020,7 @@
 </p:sld>
 </file>
 
-<file path=ppt/slides/slide12.xml><?xml version="1.0" encoding="utf-8"?>
+<file path=ppt/slides/slide13.xml><?xml version="1.0" encoding="utf-8"?>
 <p:sld xmlns:a="http://schemas.openxmlformats.org/drawingml/2006/main" xmlns:r="http://schemas.openxmlformats.org/officeDocument/2006/relationships" xmlns:p="http://schemas.openxmlformats.org/presentationml/2006/main">
   <p:cSld>
     <p:spTree>
@@ -15193,7 +15508,7 @@
 </p:sld>
 </file>
 
-<file path=ppt/slides/slide13.xml><?xml version="1.0" encoding="utf-8"?>
+<file path=ppt/slides/slide14.xml><?xml version="1.0" encoding="utf-8"?>
 <p:sld xmlns:a="http://schemas.openxmlformats.org/drawingml/2006/main" xmlns:r="http://schemas.openxmlformats.org/officeDocument/2006/relationships" xmlns:p="http://schemas.openxmlformats.org/presentationml/2006/main">
   <p:cSld>
     <p:spTree>
@@ -15735,7 +16050,7 @@
 </p:sld>
 </file>
 
-<file path=ppt/slides/slide14.xml><?xml version="1.0" encoding="utf-8"?>
+<file path=ppt/slides/slide15.xml><?xml version="1.0" encoding="utf-8"?>
 <p:sld xmlns:a="http://schemas.openxmlformats.org/drawingml/2006/main" xmlns:r="http://schemas.openxmlformats.org/officeDocument/2006/relationships" xmlns:p="http://schemas.openxmlformats.org/presentationml/2006/main">
   <p:cSld>
     <p:spTree>
@@ -15999,7 +16314,7 @@
 </p:sld>
 </file>
 
-<file path=ppt/slides/slide15.xml><?xml version="1.0" encoding="utf-8"?>
+<file path=ppt/slides/slide16.xml><?xml version="1.0" encoding="utf-8"?>
 <p:sld xmlns:a="http://schemas.openxmlformats.org/drawingml/2006/main" xmlns:r="http://schemas.openxmlformats.org/officeDocument/2006/relationships" xmlns:p="http://schemas.openxmlformats.org/presentationml/2006/main">
   <p:cSld>
     <p:spTree>
@@ -16769,7 +17084,7 @@
 </p:sld>
 </file>
 
-<file path=ppt/slides/slide16.xml><?xml version="1.0" encoding="utf-8"?>
+<file path=ppt/slides/slide17.xml><?xml version="1.0" encoding="utf-8"?>
 <p:sld xmlns:a="http://schemas.openxmlformats.org/drawingml/2006/main" xmlns:r="http://schemas.openxmlformats.org/officeDocument/2006/relationships" xmlns:p="http://schemas.openxmlformats.org/presentationml/2006/main">
   <p:cSld>
     <p:spTree>
@@ -17606,7 +17921,7 @@
 </p:sld>
 </file>
 
-<file path=ppt/slides/slide17.xml><?xml version="1.0" encoding="utf-8"?>
+<file path=ppt/slides/slide18.xml><?xml version="1.0" encoding="utf-8"?>
 <p:sld xmlns:a="http://schemas.openxmlformats.org/drawingml/2006/main" xmlns:r="http://schemas.openxmlformats.org/officeDocument/2006/relationships" xmlns:p="http://schemas.openxmlformats.org/presentationml/2006/main">
   <p:cSld>
     <p:spTree>
@@ -18421,7 +18736,7 @@
 </p:sld>
 </file>
 
-<file path=ppt/slides/slide18.xml><?xml version="1.0" encoding="utf-8"?>
+<file path=ppt/slides/slide19.xml><?xml version="1.0" encoding="utf-8"?>
 <p:sld xmlns:a="http://schemas.openxmlformats.org/drawingml/2006/main" xmlns:r="http://schemas.openxmlformats.org/officeDocument/2006/relationships" xmlns:p="http://schemas.openxmlformats.org/presentationml/2006/main">
   <p:cSld>
     <p:spTree>
@@ -19558,7 +19873,299 @@
 </p:sld>
 </file>
 
-<file path=ppt/slides/slide19.xml><?xml version="1.0" encoding="utf-8"?>
+<file path=ppt/slides/slide2.xml><?xml version="1.0" encoding="utf-8"?>
+<p:sld xmlns:a="http://schemas.openxmlformats.org/drawingml/2006/main" xmlns:r="http://schemas.openxmlformats.org/officeDocument/2006/relationships" xmlns:p="http://schemas.openxmlformats.org/presentationml/2006/main">
+  <p:cSld>
+    <p:spTree>
+      <p:nvGrpSpPr>
+        <p:cNvPr id="1" name=""/>
+        <p:cNvGrpSpPr/>
+        <p:nvPr/>
+      </p:nvGrpSpPr>
+      <p:grpSpPr>
+        <a:xfrm>
+          <a:off x="0" y="0"/>
+          <a:ext cx="0" cy="0"/>
+          <a:chOff x="0" y="0"/>
+          <a:chExt cx="0" cy="0"/>
+        </a:xfrm>
+      </p:grpSpPr>
+      <p:sp>
+        <p:nvSpPr>
+          <p:cNvPr id="2" name="Title 1"/>
+          <p:cNvSpPr>
+            <a:spLocks noGrp="1"/>
+          </p:cNvSpPr>
+          <p:nvPr>
+            <p:ph type="title"/>
+          </p:nvPr>
+        </p:nvSpPr>
+        <p:spPr>
+          <a:xfrm>
+            <a:off x="311700" y="445025"/>
+            <a:ext cx="8520599" cy="1136125"/>
+          </a:xfrm>
+        </p:spPr>
+        <p:txBody>
+          <a:bodyPr/>
+          <a:lstStyle/>
+          <a:p>
+            <a:r>
+              <a:rPr lang="en-US" sz="2400" dirty="0">
+                <a:solidFill>
+                  <a:srgbClr val="00B0F0"/>
+                </a:solidFill>
+              </a:rPr>
+              <a:t>Open source GUI https://github.com/vijayandra/logger_v1</a:t>
+            </a:r>
+            <a:endParaRPr lang="en-US" sz="2400" dirty="0">
+              <a:solidFill>
+                <a:srgbClr val="00B0F0"/>
+              </a:solidFill>
+            </a:endParaRPr>
+          </a:p>
+        </p:txBody>
+      </p:sp>
+      <p:sp>
+        <p:nvSpPr>
+          <p:cNvPr id="3" name="Text Placeholder 2"/>
+          <p:cNvSpPr>
+            <a:spLocks noGrp="1"/>
+          </p:cNvSpPr>
+          <p:nvPr>
+            <p:ph type="body" idx="1"/>
+          </p:nvPr>
+        </p:nvSpPr>
+        <p:spPr>
+          <a:xfrm>
+            <a:off x="311700" y="1657349"/>
+            <a:ext cx="8520599" cy="2911525"/>
+          </a:xfrm>
+        </p:spPr>
+        <p:txBody>
+          <a:bodyPr/>
+          <a:lstStyle/>
+          <a:p>
+            <a:endParaRPr lang="en-US" dirty="0" smtClean="0"/>
+          </a:p>
+          <a:p>
+            <a:endParaRPr lang="en-US" dirty="0"/>
+          </a:p>
+          <a:p>
+            <a:endParaRPr lang="en-US" dirty="0" smtClean="0"/>
+          </a:p>
+          <a:p>
+            <a:endParaRPr lang="en-US" dirty="0"/>
+          </a:p>
+          <a:p>
+            <a:r>
+              <a:rPr lang="en-US" sz="1400" dirty="0" smtClean="0">
+                <a:solidFill>
+                  <a:srgbClr val="C00000"/>
+                </a:solidFill>
+              </a:rPr>
+              <a:t>Modify according to need and plan to start and support for </a:t>
+            </a:r>
+            <a:r>
+              <a:rPr lang="en-US" sz="1400" dirty="0" err="1" smtClean="0">
+                <a:solidFill>
+                  <a:srgbClr val="C00000"/>
+                </a:solidFill>
+              </a:rPr>
+              <a:t>for</a:t>
+            </a:r>
+            <a:r>
+              <a:rPr lang="en-US" sz="1400" dirty="0" smtClean="0">
+                <a:solidFill>
+                  <a:srgbClr val="C00000"/>
+                </a:solidFill>
+              </a:rPr>
+              <a:t> creating open source Android/MAC </a:t>
+            </a:r>
+            <a:endParaRPr lang="en-US" sz="1400" dirty="0">
+              <a:solidFill>
+                <a:srgbClr val="C00000"/>
+              </a:solidFill>
+            </a:endParaRPr>
+          </a:p>
+        </p:txBody>
+      </p:sp>
+      <p:pic>
+        <p:nvPicPr>
+          <p:cNvPr id="1029" name="Picture 5"/>
+          <p:cNvPicPr>
+            <a:picLocks noChangeAspect="1" noChangeArrowheads="1"/>
+          </p:cNvPicPr>
+          <p:nvPr/>
+        </p:nvPicPr>
+        <p:blipFill>
+          <a:blip r:embed="rId2">
+            <a:extLst>
+              <a:ext uri="{28A0092B-C50C-407E-A947-70E740481C1C}">
+                <a14:useLocalDpi xmlns:a14="http://schemas.microsoft.com/office/drawing/2010/main" val="0"/>
+              </a:ext>
+            </a:extLst>
+          </a:blip>
+          <a:srcRect/>
+          <a:stretch>
+            <a:fillRect/>
+          </a:stretch>
+        </p:blipFill>
+        <p:spPr bwMode="auto">
+          <a:xfrm>
+            <a:off x="3276600" y="1684955"/>
+            <a:ext cx="2748208" cy="1752600"/>
+          </a:xfrm>
+          <a:prstGeom prst="rect">
+            <a:avLst/>
+          </a:prstGeom>
+          <a:noFill/>
+          <a:ln>
+            <a:noFill/>
+          </a:ln>
+          <a:extLst>
+            <a:ext uri="{909E8E84-426E-40DD-AFC4-6F175D3DCCD1}">
+              <a14:hiddenFill xmlns:a14="http://schemas.microsoft.com/office/drawing/2010/main">
+                <a:solidFill>
+                  <a:schemeClr val="accent1"/>
+                </a:solidFill>
+              </a14:hiddenFill>
+            </a:ext>
+            <a:ext uri="{91240B29-F687-4F45-9708-019B960494DF}">
+              <a14:hiddenLine xmlns:a14="http://schemas.microsoft.com/office/drawing/2010/main" w="9525">
+                <a:solidFill>
+                  <a:schemeClr val="tx1"/>
+                </a:solidFill>
+                <a:miter lim="800000"/>
+                <a:headEnd/>
+                <a:tailEnd/>
+              </a14:hiddenLine>
+            </a:ext>
+          </a:extLst>
+        </p:spPr>
+      </p:pic>
+      <p:pic>
+        <p:nvPicPr>
+          <p:cNvPr id="1030" name="Picture 6"/>
+          <p:cNvPicPr>
+            <a:picLocks noChangeAspect="1" noChangeArrowheads="1"/>
+          </p:cNvPicPr>
+          <p:nvPr/>
+        </p:nvPicPr>
+        <p:blipFill>
+          <a:blip r:embed="rId3">
+            <a:extLst>
+              <a:ext uri="{28A0092B-C50C-407E-A947-70E740481C1C}">
+                <a14:useLocalDpi xmlns:a14="http://schemas.microsoft.com/office/drawing/2010/main" val="0"/>
+              </a:ext>
+            </a:extLst>
+          </a:blip>
+          <a:srcRect/>
+          <a:stretch>
+            <a:fillRect/>
+          </a:stretch>
+        </p:blipFill>
+        <p:spPr bwMode="auto">
+          <a:xfrm>
+            <a:off x="381000" y="1657350"/>
+            <a:ext cx="2791496" cy="1780205"/>
+          </a:xfrm>
+          <a:prstGeom prst="rect">
+            <a:avLst/>
+          </a:prstGeom>
+          <a:noFill/>
+          <a:ln>
+            <a:noFill/>
+          </a:ln>
+          <a:extLst>
+            <a:ext uri="{909E8E84-426E-40DD-AFC4-6F175D3DCCD1}">
+              <a14:hiddenFill xmlns:a14="http://schemas.microsoft.com/office/drawing/2010/main">
+                <a:solidFill>
+                  <a:schemeClr val="accent1"/>
+                </a:solidFill>
+              </a14:hiddenFill>
+            </a:ext>
+            <a:ext uri="{91240B29-F687-4F45-9708-019B960494DF}">
+              <a14:hiddenLine xmlns:a14="http://schemas.microsoft.com/office/drawing/2010/main" w="9525">
+                <a:solidFill>
+                  <a:schemeClr val="tx1"/>
+                </a:solidFill>
+                <a:miter lim="800000"/>
+                <a:headEnd/>
+                <a:tailEnd/>
+              </a14:hiddenLine>
+            </a:ext>
+          </a:extLst>
+        </p:spPr>
+      </p:pic>
+      <p:pic>
+        <p:nvPicPr>
+          <p:cNvPr id="1031" name="Picture 7"/>
+          <p:cNvPicPr>
+            <a:picLocks noChangeAspect="1" noChangeArrowheads="1"/>
+          </p:cNvPicPr>
+          <p:nvPr/>
+        </p:nvPicPr>
+        <p:blipFill>
+          <a:blip r:embed="rId4">
+            <a:extLst>
+              <a:ext uri="{28A0092B-C50C-407E-A947-70E740481C1C}">
+                <a14:useLocalDpi xmlns:a14="http://schemas.microsoft.com/office/drawing/2010/main" val="0"/>
+              </a:ext>
+            </a:extLst>
+          </a:blip>
+          <a:srcRect/>
+          <a:stretch>
+            <a:fillRect/>
+          </a:stretch>
+        </p:blipFill>
+        <p:spPr bwMode="auto">
+          <a:xfrm>
+            <a:off x="6037413" y="1684955"/>
+            <a:ext cx="2748209" cy="1752600"/>
+          </a:xfrm>
+          <a:prstGeom prst="rect">
+            <a:avLst/>
+          </a:prstGeom>
+          <a:noFill/>
+          <a:ln>
+            <a:noFill/>
+          </a:ln>
+          <a:extLst>
+            <a:ext uri="{909E8E84-426E-40DD-AFC4-6F175D3DCCD1}">
+              <a14:hiddenFill xmlns:a14="http://schemas.microsoft.com/office/drawing/2010/main">
+                <a:solidFill>
+                  <a:schemeClr val="accent1"/>
+                </a:solidFill>
+              </a14:hiddenFill>
+            </a:ext>
+            <a:ext uri="{91240B29-F687-4F45-9708-019B960494DF}">
+              <a14:hiddenLine xmlns:a14="http://schemas.microsoft.com/office/drawing/2010/main" w="9525">
+                <a:solidFill>
+                  <a:schemeClr val="tx1"/>
+                </a:solidFill>
+                <a:miter lim="800000"/>
+                <a:headEnd/>
+                <a:tailEnd/>
+              </a14:hiddenLine>
+            </a:ext>
+          </a:extLst>
+        </p:spPr>
+      </p:pic>
+    </p:spTree>
+    <p:extLst>
+      <p:ext uri="{BB962C8B-B14F-4D97-AF65-F5344CB8AC3E}">
+        <p14:creationId xmlns:p14="http://schemas.microsoft.com/office/powerpoint/2010/main" val="1175743412"/>
+      </p:ext>
+    </p:extLst>
+  </p:cSld>
+  <p:clrMapOvr>
+    <a:masterClrMapping/>
+  </p:clrMapOvr>
+</p:sld>
+</file>
+
+<file path=ppt/slides/slide20.xml><?xml version="1.0" encoding="utf-8"?>
 <p:sld xmlns:a="http://schemas.openxmlformats.org/drawingml/2006/main" xmlns:r="http://schemas.openxmlformats.org/officeDocument/2006/relationships" xmlns:p="http://schemas.openxmlformats.org/presentationml/2006/main">
   <p:cSld>
     <p:spTree>
@@ -20556,591 +21163,7 @@
 </p:sld>
 </file>
 
-<file path=ppt/slides/slide2.xml><?xml version="1.0" encoding="utf-8"?>
-<p:sld xmlns:a="http://schemas.openxmlformats.org/drawingml/2006/main" xmlns:r="http://schemas.openxmlformats.org/officeDocument/2006/relationships" xmlns:p="http://schemas.openxmlformats.org/presentationml/2006/main">
-  <p:cSld>
-    <p:spTree>
-      <p:nvGrpSpPr>
-        <p:cNvPr id="1" name="Shape 108"/>
-        <p:cNvGrpSpPr/>
-        <p:nvPr/>
-      </p:nvGrpSpPr>
-      <p:grpSpPr>
-        <a:xfrm>
-          <a:off x="0" y="0"/>
-          <a:ext cx="0" cy="0"/>
-          <a:chOff x="0" y="0"/>
-          <a:chExt cx="0" cy="0"/>
-        </a:xfrm>
-      </p:grpSpPr>
-      <p:sp>
-        <p:nvSpPr>
-          <p:cNvPr id="109" name="Shape 109"/>
-          <p:cNvSpPr txBox="1">
-            <a:spLocks noGrp="1"/>
-          </p:cNvSpPr>
-          <p:nvPr>
-            <p:ph type="title"/>
-          </p:nvPr>
-        </p:nvSpPr>
-        <p:spPr>
-          <a:xfrm>
-            <a:off x="311700" y="445025"/>
-            <a:ext cx="8520600" cy="572700"/>
-          </a:xfrm>
-          <a:prstGeom prst="rect">
-            <a:avLst/>
-          </a:prstGeom>
-        </p:spPr>
-        <p:txBody>
-          <a:bodyPr lIns="91425" tIns="91425" rIns="91425" bIns="91425" anchor="t" anchorCtr="0">
-            <a:noAutofit/>
-          </a:bodyPr>
-          <a:lstStyle/>
-          <a:p>
-            <a:pPr lvl="0" algn="ctr">
-              <a:spcBef>
-                <a:spcPts val="0"/>
-              </a:spcBef>
-              <a:buNone/>
-            </a:pPr>
-            <a:r>
-              <a:rPr lang="en"/>
-              <a:t>Concept</a:t>
-            </a:r>
-          </a:p>
-        </p:txBody>
-      </p:sp>
-      <p:sp>
-        <p:nvSpPr>
-          <p:cNvPr id="110" name="Shape 110"/>
-          <p:cNvSpPr txBox="1">
-            <a:spLocks noGrp="1"/>
-          </p:cNvSpPr>
-          <p:nvPr>
-            <p:ph type="body" idx="1"/>
-          </p:nvPr>
-        </p:nvSpPr>
-        <p:spPr>
-          <a:xfrm>
-            <a:off x="311700" y="1234075"/>
-            <a:ext cx="8520600" cy="3794400"/>
-          </a:xfrm>
-          <a:prstGeom prst="rect">
-            <a:avLst/>
-          </a:prstGeom>
-        </p:spPr>
-        <p:txBody>
-          <a:bodyPr lIns="91425" tIns="91425" rIns="91425" bIns="91425" anchor="t" anchorCtr="0">
-            <a:noAutofit/>
-          </a:bodyPr>
-          <a:lstStyle/>
-          <a:p>
-            <a:pPr lvl="0">
-              <a:spcBef>
-                <a:spcPts val="0"/>
-              </a:spcBef>
-              <a:buNone/>
-            </a:pPr>
-            <a:r>
-              <a:rPr lang="en" dirty="0"/>
-              <a:t>Device </a:t>
-            </a:r>
-            <a:r>
-              <a:rPr lang="en" b="1" dirty="0">
-                <a:solidFill>
-                  <a:srgbClr val="CC0000"/>
-                </a:solidFill>
-              </a:rPr>
-              <a:t>runs user defined “C” code without compiling.</a:t>
-            </a:r>
-            <a:r>
-              <a:rPr lang="en" dirty="0"/>
-              <a:t> This saves time of learning device specific compiler/debugger/Libraries. STPS system has onboard SD card for saving device specific data.</a:t>
-            </a:r>
-          </a:p>
-          <a:p>
-            <a:pPr lvl="0">
-              <a:spcBef>
-                <a:spcPts val="0"/>
-              </a:spcBef>
-              <a:buNone/>
-            </a:pPr>
-            <a:endParaRPr dirty="0"/>
-          </a:p>
-        </p:txBody>
-      </p:sp>
-      <p:sp>
-        <p:nvSpPr>
-          <p:cNvPr id="111" name="Shape 111"/>
-          <p:cNvSpPr/>
-          <p:nvPr/>
-        </p:nvSpPr>
-        <p:spPr>
-          <a:xfrm>
-            <a:off x="4877750" y="2478275"/>
-            <a:ext cx="2557200" cy="2374500"/>
-          </a:xfrm>
-          <a:prstGeom prst="roundRect">
-            <a:avLst>
-              <a:gd name="adj" fmla="val 16667"/>
-            </a:avLst>
-          </a:prstGeom>
-          <a:solidFill>
-            <a:schemeClr val="lt2"/>
-          </a:solidFill>
-          <a:ln w="9525" cap="flat" cmpd="sng">
-            <a:solidFill>
-              <a:schemeClr val="dk2"/>
-            </a:solidFill>
-            <a:prstDash val="solid"/>
-            <a:round/>
-            <a:headEnd type="none" w="med" len="med"/>
-            <a:tailEnd type="none" w="med" len="med"/>
-          </a:ln>
-        </p:spPr>
-        <p:txBody>
-          <a:bodyPr lIns="91425" tIns="91425" rIns="91425" bIns="91425" anchor="ctr" anchorCtr="0">
-            <a:noAutofit/>
-          </a:bodyPr>
-          <a:lstStyle/>
-          <a:p>
-            <a:pPr lvl="0" rtl="0">
-              <a:lnSpc>
-                <a:spcPct val="115000"/>
-              </a:lnSpc>
-              <a:spcBef>
-                <a:spcPts val="0"/>
-              </a:spcBef>
-              <a:buClr>
-                <a:schemeClr val="dk2"/>
-              </a:buClr>
-              <a:buFont typeface="Arial"/>
-              <a:buNone/>
-            </a:pPr>
-            <a:endParaRPr>
-              <a:solidFill>
-                <a:srgbClr val="FF0000"/>
-              </a:solidFill>
-              <a:latin typeface="Playfair Display"/>
-              <a:ea typeface="Playfair Display"/>
-              <a:cs typeface="Playfair Display"/>
-              <a:sym typeface="Playfair Display"/>
-            </a:endParaRPr>
-          </a:p>
-          <a:p>
-            <a:pPr lvl="0" rtl="0">
-              <a:lnSpc>
-                <a:spcPct val="115000"/>
-              </a:lnSpc>
-              <a:spcBef>
-                <a:spcPts val="0"/>
-              </a:spcBef>
-              <a:buClr>
-                <a:schemeClr val="dk2"/>
-              </a:buClr>
-              <a:buFont typeface="Arial"/>
-              <a:buNone/>
-            </a:pPr>
-            <a:r>
-              <a:rPr lang="en" b="1">
-                <a:solidFill>
-                  <a:srgbClr val="1155CC"/>
-                </a:solidFill>
-                <a:latin typeface="Playfair Display"/>
-                <a:ea typeface="Playfair Display"/>
-                <a:cs typeface="Playfair Display"/>
-                <a:sym typeface="Playfair Display"/>
-              </a:rPr>
-              <a:t>#include&lt;stdio.h&gt;</a:t>
-            </a:r>
-          </a:p>
-          <a:p>
-            <a:pPr lvl="0" rtl="0">
-              <a:lnSpc>
-                <a:spcPct val="115000"/>
-              </a:lnSpc>
-              <a:spcBef>
-                <a:spcPts val="0"/>
-              </a:spcBef>
-              <a:buClr>
-                <a:schemeClr val="dk2"/>
-              </a:buClr>
-              <a:buFont typeface="Arial"/>
-              <a:buNone/>
-            </a:pPr>
-            <a:r>
-              <a:rPr lang="en" b="1">
-                <a:solidFill>
-                  <a:srgbClr val="1155CC"/>
-                </a:solidFill>
-                <a:latin typeface="Playfair Display"/>
-                <a:ea typeface="Playfair Display"/>
-                <a:cs typeface="Playfair Display"/>
-                <a:sym typeface="Playfair Display"/>
-              </a:rPr>
-              <a:t>void  main()</a:t>
-            </a:r>
-          </a:p>
-          <a:p>
-            <a:pPr lvl="0" rtl="0">
-              <a:lnSpc>
-                <a:spcPct val="115000"/>
-              </a:lnSpc>
-              <a:spcBef>
-                <a:spcPts val="0"/>
-              </a:spcBef>
-              <a:buClr>
-                <a:schemeClr val="dk2"/>
-              </a:buClr>
-              <a:buFont typeface="Arial"/>
-              <a:buNone/>
-            </a:pPr>
-            <a:r>
-              <a:rPr lang="en" b="1">
-                <a:solidFill>
-                  <a:srgbClr val="1155CC"/>
-                </a:solidFill>
-                <a:latin typeface="Playfair Display"/>
-                <a:ea typeface="Playfair Display"/>
-                <a:cs typeface="Playfair Display"/>
-                <a:sym typeface="Playfair Display"/>
-              </a:rPr>
-              <a:t>{        </a:t>
-            </a:r>
-          </a:p>
-          <a:p>
-            <a:pPr lvl="0" rtl="0">
-              <a:lnSpc>
-                <a:spcPct val="115000"/>
-              </a:lnSpc>
-              <a:spcBef>
-                <a:spcPts val="0"/>
-              </a:spcBef>
-              <a:buNone/>
-            </a:pPr>
-            <a:r>
-              <a:rPr lang="en" b="1">
-                <a:solidFill>
-                  <a:srgbClr val="1155CC"/>
-                </a:solidFill>
-                <a:latin typeface="Playfair Display"/>
-                <a:ea typeface="Playfair Display"/>
-                <a:cs typeface="Playfair Display"/>
-                <a:sym typeface="Playfair Display"/>
-              </a:rPr>
-              <a:t>      led_on(1); </a:t>
-            </a:r>
-          </a:p>
-          <a:p>
-            <a:pPr lvl="0" rtl="0">
-              <a:lnSpc>
-                <a:spcPct val="115000"/>
-              </a:lnSpc>
-              <a:spcBef>
-                <a:spcPts val="0"/>
-              </a:spcBef>
-              <a:buNone/>
-            </a:pPr>
-            <a:r>
-              <a:rPr lang="en" b="1">
-                <a:solidFill>
-                  <a:srgbClr val="1155CC"/>
-                </a:solidFill>
-                <a:latin typeface="Playfair Display"/>
-                <a:ea typeface="Playfair Display"/>
-                <a:cs typeface="Playfair Display"/>
-                <a:sym typeface="Playfair Display"/>
-              </a:rPr>
-              <a:t>      ms_wait(100);</a:t>
-            </a:r>
-          </a:p>
-          <a:p>
-            <a:pPr lvl="0" rtl="0">
-              <a:lnSpc>
-                <a:spcPct val="115000"/>
-              </a:lnSpc>
-              <a:spcBef>
-                <a:spcPts val="0"/>
-              </a:spcBef>
-              <a:buClr>
-                <a:schemeClr val="dk2"/>
-              </a:buClr>
-              <a:buFont typeface="Arial"/>
-              <a:buNone/>
-            </a:pPr>
-            <a:r>
-              <a:rPr lang="en" b="1">
-                <a:solidFill>
-                  <a:srgbClr val="1155CC"/>
-                </a:solidFill>
-                <a:latin typeface="Playfair Display"/>
-                <a:ea typeface="Playfair Display"/>
-                <a:cs typeface="Playfair Display"/>
-                <a:sym typeface="Playfair Display"/>
-              </a:rPr>
-              <a:t>      led_off(1);  </a:t>
-            </a:r>
-          </a:p>
-          <a:p>
-            <a:pPr lvl="0" rtl="0">
-              <a:lnSpc>
-                <a:spcPct val="115000"/>
-              </a:lnSpc>
-              <a:spcBef>
-                <a:spcPts val="0"/>
-              </a:spcBef>
-              <a:buClr>
-                <a:schemeClr val="dk2"/>
-              </a:buClr>
-              <a:buFont typeface="Arial"/>
-              <a:buNone/>
-            </a:pPr>
-            <a:r>
-              <a:rPr lang="en" b="1">
-                <a:solidFill>
-                  <a:srgbClr val="1155CC"/>
-                </a:solidFill>
-                <a:latin typeface="Playfair Display"/>
-                <a:ea typeface="Playfair Display"/>
-                <a:cs typeface="Playfair Display"/>
-                <a:sym typeface="Playfair Display"/>
-              </a:rPr>
-              <a:t>      Return 0;</a:t>
-            </a:r>
-          </a:p>
-          <a:p>
-            <a:pPr lvl="0" rtl="0">
-              <a:lnSpc>
-                <a:spcPct val="115000"/>
-              </a:lnSpc>
-              <a:spcBef>
-                <a:spcPts val="0"/>
-              </a:spcBef>
-              <a:buClr>
-                <a:schemeClr val="dk2"/>
-              </a:buClr>
-              <a:buFont typeface="Arial"/>
-              <a:buNone/>
-            </a:pPr>
-            <a:r>
-              <a:rPr lang="en" b="1">
-                <a:solidFill>
-                  <a:srgbClr val="1155CC"/>
-                </a:solidFill>
-                <a:latin typeface="Playfair Display"/>
-                <a:ea typeface="Playfair Display"/>
-                <a:cs typeface="Playfair Display"/>
-                <a:sym typeface="Playfair Display"/>
-              </a:rPr>
-              <a:t>}</a:t>
-            </a:r>
-          </a:p>
-          <a:p>
-            <a:pPr lvl="0">
-              <a:spcBef>
-                <a:spcPts val="0"/>
-              </a:spcBef>
-              <a:buNone/>
-            </a:pPr>
-            <a:endParaRPr/>
-          </a:p>
-        </p:txBody>
-      </p:sp>
-      <p:sp>
-        <p:nvSpPr>
-          <p:cNvPr id="112" name="Shape 112"/>
-          <p:cNvSpPr txBox="1"/>
-          <p:nvPr/>
-        </p:nvSpPr>
-        <p:spPr>
-          <a:xfrm>
-            <a:off x="1979875" y="2478275"/>
-            <a:ext cx="2520000" cy="2485200"/>
-          </a:xfrm>
-          <a:prstGeom prst="rect">
-            <a:avLst/>
-          </a:prstGeom>
-          <a:noFill/>
-          <a:ln>
-            <a:noFill/>
-          </a:ln>
-        </p:spPr>
-        <p:txBody>
-          <a:bodyPr lIns="91425" tIns="91425" rIns="91425" bIns="91425" anchor="t" anchorCtr="0">
-            <a:noAutofit/>
-          </a:bodyPr>
-          <a:lstStyle/>
-          <a:p>
-            <a:pPr lvl="0" rtl="0">
-              <a:lnSpc>
-                <a:spcPct val="115000"/>
-              </a:lnSpc>
-              <a:spcBef>
-                <a:spcPts val="0"/>
-              </a:spcBef>
-              <a:spcAft>
-                <a:spcPts val="1600"/>
-              </a:spcAft>
-              <a:buClr>
-                <a:schemeClr val="dk2"/>
-              </a:buClr>
-              <a:buSzPct val="61111"/>
-              <a:buFont typeface="Arial"/>
-              <a:buNone/>
-            </a:pPr>
-            <a:r>
-              <a:rPr lang="en" sz="1800" b="1">
-                <a:solidFill>
-                  <a:schemeClr val="dk2"/>
-                </a:solidFill>
-                <a:latin typeface="Playfair Display"/>
-                <a:ea typeface="Playfair Display"/>
-                <a:cs typeface="Playfair Display"/>
-                <a:sym typeface="Playfair Display"/>
-              </a:rPr>
-              <a:t>For example:</a:t>
-            </a:r>
-            <a:r>
-              <a:rPr lang="en" sz="1800">
-                <a:solidFill>
-                  <a:schemeClr val="dk2"/>
-                </a:solidFill>
-                <a:latin typeface="Playfair Display"/>
-                <a:ea typeface="Playfair Display"/>
-                <a:cs typeface="Playfair Display"/>
-                <a:sym typeface="Playfair Display"/>
-              </a:rPr>
-              <a:t> “</a:t>
-            </a:r>
-            <a:r>
-              <a:rPr lang="en" sz="1800" b="1">
-                <a:solidFill>
-                  <a:srgbClr val="CC0000"/>
-                </a:solidFill>
-                <a:latin typeface="Playfair Display"/>
-                <a:ea typeface="Playfair Display"/>
-                <a:cs typeface="Playfair Display"/>
-                <a:sym typeface="Playfair Display"/>
-              </a:rPr>
-              <a:t>autoexec.c”</a:t>
-            </a:r>
-            <a:r>
-              <a:rPr lang="en" sz="1800">
-                <a:solidFill>
-                  <a:schemeClr val="dk2"/>
-                </a:solidFill>
-                <a:latin typeface="Playfair Display"/>
-                <a:ea typeface="Playfair Display"/>
-                <a:cs typeface="Playfair Display"/>
-                <a:sym typeface="Playfair Display"/>
-              </a:rPr>
-              <a:t> file in SD Card(FAT32) will cause LED to be ON for second and then turned OFF.</a:t>
-            </a:r>
-          </a:p>
-          <a:p>
-            <a:pPr lvl="0">
-              <a:spcBef>
-                <a:spcPts val="0"/>
-              </a:spcBef>
-              <a:buNone/>
-            </a:pPr>
-            <a:endParaRPr/>
-          </a:p>
-        </p:txBody>
-      </p:sp>
-    </p:spTree>
-  </p:cSld>
-  <p:clrMapOvr>
-    <a:masterClrMapping/>
-  </p:clrMapOvr>
-  <p:timing>
-    <p:tnLst>
-      <p:par>
-        <p:cTn id="1" dur="indefinite" restart="never" nodeType="tmRoot">
-          <p:childTnLst>
-            <p:seq concurrent="1" nextAc="seek">
-              <p:cTn id="2" dur="indefinite" nodeType="mainSeq">
-                <p:childTnLst>
-                  <p:par>
-                    <p:cTn id="3" fill="hold">
-                      <p:stCondLst>
-                        <p:cond delay="indefinite"/>
-                      </p:stCondLst>
-                      <p:childTnLst>
-                        <p:par>
-                          <p:cTn id="4" fill="hold">
-                            <p:stCondLst>
-                              <p:cond delay="0"/>
-                            </p:stCondLst>
-                            <p:childTnLst>
-                              <p:par>
-                                <p:cTn id="5" presetID="10" presetClass="entr" presetSubtype="0" fill="hold" nodeType="clickEffect">
-                                  <p:stCondLst>
-                                    <p:cond delay="0"/>
-                                  </p:stCondLst>
-                                  <p:childTnLst>
-                                    <p:set>
-                                      <p:cBhvr>
-                                        <p:cTn id="6" dur="1" fill="hold">
-                                          <p:stCondLst>
-                                            <p:cond delay="0"/>
-                                          </p:stCondLst>
-                                        </p:cTn>
-                                        <p:tgtEl>
-                                          <p:spTgt spid="110"/>
-                                        </p:tgtEl>
-                                        <p:attrNameLst>
-                                          <p:attrName>style.visibility</p:attrName>
-                                        </p:attrNameLst>
-                                      </p:cBhvr>
-                                      <p:to>
-                                        <p:strVal val="visible"/>
-                                      </p:to>
-                                    </p:set>
-                                    <p:animEffect transition="in" filter="fade">
-                                      <p:cBhvr>
-                                        <p:cTn id="7" dur="1000"/>
-                                        <p:tgtEl>
-                                          <p:spTgt spid="110"/>
-                                        </p:tgtEl>
-                                      </p:cBhvr>
-                                    </p:animEffect>
-                                  </p:childTnLst>
-                                </p:cTn>
-                              </p:par>
-                            </p:childTnLst>
-                          </p:cTn>
-                        </p:par>
-                      </p:childTnLst>
-                    </p:cTn>
-                  </p:par>
-                </p:childTnLst>
-              </p:cTn>
-              <p:prevCondLst>
-                <p:cond evt="onPrev" delay="0">
-                  <p:tgtEl>
-                    <p:sldTgt/>
-                  </p:tgtEl>
-                </p:cond>
-              </p:prevCondLst>
-              <p:nextCondLst>
-                <p:cond evt="onNext" delay="0">
-                  <p:tgtEl>
-                    <p:sldTgt/>
-                  </p:tgtEl>
-                </p:cond>
-              </p:nextCondLst>
-            </p:seq>
-          </p:childTnLst>
-        </p:cTn>
-      </p:par>
-    </p:tnLst>
-  </p:timing>
-</p:sld>
-</file>
-
-<file path=ppt/slides/slide20.xml><?xml version="1.0" encoding="utf-8"?>
+<file path=ppt/slides/slide21.xml><?xml version="1.0" encoding="utf-8"?>
 <p:sld xmlns:a="http://schemas.openxmlformats.org/drawingml/2006/main" xmlns:r="http://schemas.openxmlformats.org/officeDocument/2006/relationships" xmlns:p="http://schemas.openxmlformats.org/presentationml/2006/main">
   <p:cSld>
     <p:spTree>
@@ -22267,7 +22290,7 @@
 </p:sld>
 </file>
 
-<file path=ppt/slides/slide21.xml><?xml version="1.0" encoding="utf-8"?>
+<file path=ppt/slides/slide22.xml><?xml version="1.0" encoding="utf-8"?>
 <p:sld xmlns:a="http://schemas.openxmlformats.org/drawingml/2006/main" xmlns:r="http://schemas.openxmlformats.org/officeDocument/2006/relationships" xmlns:p="http://schemas.openxmlformats.org/presentationml/2006/main">
   <p:cSld>
     <p:spTree>
@@ -22599,7 +22622,7 @@
 </p:sld>
 </file>
 
-<file path=ppt/slides/slide22.xml><?xml version="1.0" encoding="utf-8"?>
+<file path=ppt/slides/slide23.xml><?xml version="1.0" encoding="utf-8"?>
 <p:sld xmlns:a="http://schemas.openxmlformats.org/drawingml/2006/main" xmlns:r="http://schemas.openxmlformats.org/officeDocument/2006/relationships" xmlns:p="http://schemas.openxmlformats.org/presentationml/2006/main">
   <p:cSld>
     <p:spTree>
@@ -22738,112 +22761,6 @@
         </p:txBody>
       </p:sp>
     </p:spTree>
-  </p:cSld>
-  <p:clrMapOvr>
-    <a:masterClrMapping/>
-  </p:clrMapOvr>
-</p:sld>
-</file>
-
-<file path=ppt/slides/slide23.xml><?xml version="1.0" encoding="utf-8"?>
-<p:sld xmlns:a="http://schemas.openxmlformats.org/drawingml/2006/main" xmlns:r="http://schemas.openxmlformats.org/officeDocument/2006/relationships" xmlns:p="http://schemas.openxmlformats.org/presentationml/2006/main">
-  <p:cSld>
-    <p:spTree>
-      <p:nvGrpSpPr>
-        <p:cNvPr id="1" name=""/>
-        <p:cNvGrpSpPr/>
-        <p:nvPr/>
-      </p:nvGrpSpPr>
-      <p:grpSpPr>
-        <a:xfrm>
-          <a:off x="0" y="0"/>
-          <a:ext cx="0" cy="0"/>
-          <a:chOff x="0" y="0"/>
-          <a:chExt cx="0" cy="0"/>
-        </a:xfrm>
-      </p:grpSpPr>
-      <p:sp>
-        <p:nvSpPr>
-          <p:cNvPr id="2" name="Title 1"/>
-          <p:cNvSpPr>
-            <a:spLocks noGrp="1"/>
-          </p:cNvSpPr>
-          <p:nvPr>
-            <p:ph type="title"/>
-          </p:nvPr>
-        </p:nvSpPr>
-        <p:spPr/>
-        <p:txBody>
-          <a:bodyPr/>
-          <a:lstStyle/>
-          <a:p>
-            <a:r>
-              <a:rPr lang="en-US" dirty="0" smtClean="0"/>
-              <a:t>Permanent deployment for purpose of logging</a:t>
-            </a:r>
-            <a:endParaRPr lang="en-US" dirty="0"/>
-          </a:p>
-        </p:txBody>
-      </p:sp>
-      <p:sp>
-        <p:nvSpPr>
-          <p:cNvPr id="3" name="Text Placeholder 2"/>
-          <p:cNvSpPr>
-            <a:spLocks noGrp="1"/>
-          </p:cNvSpPr>
-          <p:nvPr>
-            <p:ph type="body" idx="1"/>
-          </p:nvPr>
-        </p:nvSpPr>
-        <p:spPr/>
-        <p:txBody>
-          <a:bodyPr/>
-          <a:lstStyle/>
-          <a:p>
-            <a:r>
-              <a:rPr lang="en-US" dirty="0" smtClean="0"/>
-              <a:t>1.Non stop logging of 2UART and 1RS485 Data into SD Card.</a:t>
-            </a:r>
-          </a:p>
-          <a:p>
-            <a:r>
-              <a:rPr lang="en-US" dirty="0" smtClean="0"/>
-              <a:t>2.Humidity / Temperature logging into CSV file .</a:t>
-            </a:r>
-          </a:p>
-          <a:p>
-            <a:r>
-              <a:rPr lang="en-US" dirty="0" smtClean="0"/>
-              <a:t>3.Dual Channel ADC 12bit logging to CSV file.</a:t>
-            </a:r>
-          </a:p>
-          <a:p>
-            <a:r>
-              <a:rPr lang="en-US" dirty="0" smtClean="0"/>
-              <a:t>4.Direct dual analog signal generation based off CSV file stored in SD Card.</a:t>
-            </a:r>
-          </a:p>
-          <a:p>
-            <a:r>
-              <a:rPr lang="en-US" dirty="0" smtClean="0"/>
-              <a:t>5.I2C Master signal.</a:t>
-            </a:r>
-          </a:p>
-          <a:p>
-            <a:r>
-              <a:rPr lang="en-US" dirty="0" smtClean="0"/>
-              <a:t>6. Completely open source cross platform QT application.</a:t>
-            </a:r>
-            <a:endParaRPr lang="en-US" dirty="0"/>
-          </a:p>
-        </p:txBody>
-      </p:sp>
-    </p:spTree>
-    <p:extLst>
-      <p:ext uri="{BB962C8B-B14F-4D97-AF65-F5344CB8AC3E}">
-        <p14:creationId xmlns:p14="http://schemas.microsoft.com/office/powerpoint/2010/main" val="3073017986"/>
-      </p:ext>
-    </p:extLst>
   </p:cSld>
   <p:clrMapOvr>
     <a:masterClrMapping/>
@@ -22908,178 +22825,46 @@
           <a:p>
             <a:r>
               <a:rPr lang="en-US" dirty="0" smtClean="0"/>
-              <a:t>Open source PC application, located at</a:t>
+              <a:t>1.Non stop logging of 2UART and 1RS485 Data into SD Card.</a:t>
+            </a:r>
+          </a:p>
+          <a:p>
+            <a:r>
+              <a:rPr lang="en-US" dirty="0" smtClean="0"/>
+              <a:t>2.Humidity / Temperature logging into CSV file .</a:t>
+            </a:r>
+          </a:p>
+          <a:p>
+            <a:r>
+              <a:rPr lang="en-US" dirty="0" smtClean="0"/>
+              <a:t>3.Dual Channel ADC 12bit logging to CSV file.</a:t>
+            </a:r>
+          </a:p>
+          <a:p>
+            <a:r>
+              <a:rPr lang="en-US" dirty="0" smtClean="0"/>
+              <a:t>4.Direct dual analog signal generation based off CSV file stored in SD Card.</a:t>
+            </a:r>
+          </a:p>
+          <a:p>
+            <a:r>
+              <a:rPr lang="en-US" dirty="0" smtClean="0"/>
+              <a:t>5.I2C Master signal.</a:t>
+            </a:r>
+          </a:p>
+          <a:p>
+            <a:r>
+              <a:rPr lang="en-US" dirty="0" smtClean="0"/>
+              <a:t>6. Completely open source cross platform QT application.</a:t>
             </a:r>
             <a:endParaRPr lang="en-US" dirty="0"/>
           </a:p>
         </p:txBody>
       </p:sp>
-      <p:pic>
-        <p:nvPicPr>
-          <p:cNvPr id="1029" name="Picture 5"/>
-          <p:cNvPicPr>
-            <a:picLocks noChangeAspect="1" noChangeArrowheads="1"/>
-          </p:cNvPicPr>
-          <p:nvPr/>
-        </p:nvPicPr>
-        <p:blipFill>
-          <a:blip r:embed="rId2">
-            <a:extLst>
-              <a:ext uri="{28A0092B-C50C-407E-A947-70E740481C1C}">
-                <a14:useLocalDpi xmlns:a14="http://schemas.microsoft.com/office/drawing/2010/main" val="0"/>
-              </a:ext>
-            </a:extLst>
-          </a:blip>
-          <a:srcRect/>
-          <a:stretch>
-            <a:fillRect/>
-          </a:stretch>
-        </p:blipFill>
-        <p:spPr bwMode="auto">
-          <a:xfrm>
-            <a:off x="3352800" y="1885951"/>
-            <a:ext cx="2748208" cy="1752600"/>
-          </a:xfrm>
-          <a:prstGeom prst="rect">
-            <a:avLst/>
-          </a:prstGeom>
-          <a:noFill/>
-          <a:ln>
-            <a:noFill/>
-          </a:ln>
-          <a:extLst>
-            <a:ext uri="{909E8E84-426E-40DD-AFC4-6F175D3DCCD1}">
-              <a14:hiddenFill xmlns:a14="http://schemas.microsoft.com/office/drawing/2010/main">
-                <a:solidFill>
-                  <a:schemeClr val="accent1"/>
-                </a:solidFill>
-              </a14:hiddenFill>
-            </a:ext>
-            <a:ext uri="{91240B29-F687-4F45-9708-019B960494DF}">
-              <a14:hiddenLine xmlns:a14="http://schemas.microsoft.com/office/drawing/2010/main" w="9525">
-                <a:solidFill>
-                  <a:schemeClr val="tx1"/>
-                </a:solidFill>
-                <a:miter lim="800000"/>
-                <a:headEnd/>
-                <a:tailEnd/>
-              </a14:hiddenLine>
-            </a:ext>
-          </a:extLst>
-        </p:spPr>
-      </p:pic>
-      <p:pic>
-        <p:nvPicPr>
-          <p:cNvPr id="1030" name="Picture 6"/>
-          <p:cNvPicPr>
-            <a:picLocks noChangeAspect="1" noChangeArrowheads="1"/>
-          </p:cNvPicPr>
-          <p:nvPr/>
-        </p:nvPicPr>
-        <p:blipFill>
-          <a:blip r:embed="rId3">
-            <a:extLst>
-              <a:ext uri="{28A0092B-C50C-407E-A947-70E740481C1C}">
-                <a14:useLocalDpi xmlns:a14="http://schemas.microsoft.com/office/drawing/2010/main" val="0"/>
-              </a:ext>
-            </a:extLst>
-          </a:blip>
-          <a:srcRect/>
-          <a:stretch>
-            <a:fillRect/>
-          </a:stretch>
-        </p:blipFill>
-        <p:spPr bwMode="auto">
-          <a:xfrm>
-            <a:off x="485104" y="1885951"/>
-            <a:ext cx="2791496" cy="1780205"/>
-          </a:xfrm>
-          <a:prstGeom prst="rect">
-            <a:avLst/>
-          </a:prstGeom>
-          <a:noFill/>
-          <a:ln>
-            <a:noFill/>
-          </a:ln>
-          <a:extLst>
-            <a:ext uri="{909E8E84-426E-40DD-AFC4-6F175D3DCCD1}">
-              <a14:hiddenFill xmlns:a14="http://schemas.microsoft.com/office/drawing/2010/main">
-                <a:solidFill>
-                  <a:schemeClr val="accent1"/>
-                </a:solidFill>
-              </a14:hiddenFill>
-            </a:ext>
-            <a:ext uri="{91240B29-F687-4F45-9708-019B960494DF}">
-              <a14:hiddenLine xmlns:a14="http://schemas.microsoft.com/office/drawing/2010/main" w="9525">
-                <a:solidFill>
-                  <a:schemeClr val="tx1"/>
-                </a:solidFill>
-                <a:miter lim="800000"/>
-                <a:headEnd/>
-                <a:tailEnd/>
-              </a14:hiddenLine>
-            </a:ext>
-          </a:extLst>
-        </p:spPr>
-      </p:pic>
-      <p:pic>
-        <p:nvPicPr>
-          <p:cNvPr id="1031" name="Picture 7"/>
-          <p:cNvPicPr>
-            <a:picLocks noChangeAspect="1" noChangeArrowheads="1"/>
-          </p:cNvPicPr>
-          <p:nvPr/>
-        </p:nvPicPr>
-        <p:blipFill>
-          <a:blip r:embed="rId4">
-            <a:extLst>
-              <a:ext uri="{28A0092B-C50C-407E-A947-70E740481C1C}">
-                <a14:useLocalDpi xmlns:a14="http://schemas.microsoft.com/office/drawing/2010/main" val="0"/>
-              </a:ext>
-            </a:extLst>
-          </a:blip>
-          <a:srcRect/>
-          <a:stretch>
-            <a:fillRect/>
-          </a:stretch>
-        </p:blipFill>
-        <p:spPr bwMode="auto">
-          <a:xfrm>
-            <a:off x="6151998" y="1885951"/>
-            <a:ext cx="2748209" cy="1752600"/>
-          </a:xfrm>
-          <a:prstGeom prst="rect">
-            <a:avLst/>
-          </a:prstGeom>
-          <a:noFill/>
-          <a:ln>
-            <a:noFill/>
-          </a:ln>
-          <a:extLst>
-            <a:ext uri="{909E8E84-426E-40DD-AFC4-6F175D3DCCD1}">
-              <a14:hiddenFill xmlns:a14="http://schemas.microsoft.com/office/drawing/2010/main">
-                <a:solidFill>
-                  <a:schemeClr val="accent1"/>
-                </a:solidFill>
-              </a14:hiddenFill>
-            </a:ext>
-            <a:ext uri="{91240B29-F687-4F45-9708-019B960494DF}">
-              <a14:hiddenLine xmlns:a14="http://schemas.microsoft.com/office/drawing/2010/main" w="9525">
-                <a:solidFill>
-                  <a:schemeClr val="tx1"/>
-                </a:solidFill>
-                <a:miter lim="800000"/>
-                <a:headEnd/>
-                <a:tailEnd/>
-              </a14:hiddenLine>
-            </a:ext>
-          </a:extLst>
-        </p:spPr>
-      </p:pic>
     </p:spTree>
     <p:extLst>
       <p:ext uri="{BB962C8B-B14F-4D97-AF65-F5344CB8AC3E}">
-        <p14:creationId xmlns:p14="http://schemas.microsoft.com/office/powerpoint/2010/main" val="1175743412"/>
+        <p14:creationId xmlns:p14="http://schemas.microsoft.com/office/powerpoint/2010/main" val="3073017986"/>
       </p:ext>
     </p:extLst>
   </p:cSld>
@@ -23090,6 +22875,590 @@
 </file>
 
 <file path=ppt/slides/slide3.xml><?xml version="1.0" encoding="utf-8"?>
+<p:sld xmlns:a="http://schemas.openxmlformats.org/drawingml/2006/main" xmlns:r="http://schemas.openxmlformats.org/officeDocument/2006/relationships" xmlns:p="http://schemas.openxmlformats.org/presentationml/2006/main">
+  <p:cSld>
+    <p:spTree>
+      <p:nvGrpSpPr>
+        <p:cNvPr id="1" name="Shape 108"/>
+        <p:cNvGrpSpPr/>
+        <p:nvPr/>
+      </p:nvGrpSpPr>
+      <p:grpSpPr>
+        <a:xfrm>
+          <a:off x="0" y="0"/>
+          <a:ext cx="0" cy="0"/>
+          <a:chOff x="0" y="0"/>
+          <a:chExt cx="0" cy="0"/>
+        </a:xfrm>
+      </p:grpSpPr>
+      <p:sp>
+        <p:nvSpPr>
+          <p:cNvPr id="109" name="Shape 109"/>
+          <p:cNvSpPr txBox="1">
+            <a:spLocks noGrp="1"/>
+          </p:cNvSpPr>
+          <p:nvPr>
+            <p:ph type="title"/>
+          </p:nvPr>
+        </p:nvSpPr>
+        <p:spPr>
+          <a:xfrm>
+            <a:off x="311700" y="445025"/>
+            <a:ext cx="8520600" cy="572700"/>
+          </a:xfrm>
+          <a:prstGeom prst="rect">
+            <a:avLst/>
+          </a:prstGeom>
+        </p:spPr>
+        <p:txBody>
+          <a:bodyPr lIns="91425" tIns="91425" rIns="91425" bIns="91425" anchor="t" anchorCtr="0">
+            <a:noAutofit/>
+          </a:bodyPr>
+          <a:lstStyle/>
+          <a:p>
+            <a:pPr lvl="0" algn="ctr">
+              <a:spcBef>
+                <a:spcPts val="0"/>
+              </a:spcBef>
+              <a:buNone/>
+            </a:pPr>
+            <a:r>
+              <a:rPr lang="en"/>
+              <a:t>Concept</a:t>
+            </a:r>
+          </a:p>
+        </p:txBody>
+      </p:sp>
+      <p:sp>
+        <p:nvSpPr>
+          <p:cNvPr id="110" name="Shape 110"/>
+          <p:cNvSpPr txBox="1">
+            <a:spLocks noGrp="1"/>
+          </p:cNvSpPr>
+          <p:nvPr>
+            <p:ph type="body" idx="1"/>
+          </p:nvPr>
+        </p:nvSpPr>
+        <p:spPr>
+          <a:xfrm>
+            <a:off x="311700" y="1234075"/>
+            <a:ext cx="8520600" cy="3794400"/>
+          </a:xfrm>
+          <a:prstGeom prst="rect">
+            <a:avLst/>
+          </a:prstGeom>
+        </p:spPr>
+        <p:txBody>
+          <a:bodyPr lIns="91425" tIns="91425" rIns="91425" bIns="91425" anchor="t" anchorCtr="0">
+            <a:noAutofit/>
+          </a:bodyPr>
+          <a:lstStyle/>
+          <a:p>
+            <a:pPr lvl="0">
+              <a:spcBef>
+                <a:spcPts val="0"/>
+              </a:spcBef>
+              <a:buNone/>
+            </a:pPr>
+            <a:r>
+              <a:rPr lang="en" dirty="0"/>
+              <a:t>Device </a:t>
+            </a:r>
+            <a:r>
+              <a:rPr lang="en" b="1" dirty="0">
+                <a:solidFill>
+                  <a:srgbClr val="CC0000"/>
+                </a:solidFill>
+              </a:rPr>
+              <a:t>runs user defined “C” code without compiling.</a:t>
+            </a:r>
+            <a:r>
+              <a:rPr lang="en" dirty="0"/>
+              <a:t> This saves time of learning device specific compiler/debugger/Libraries. STPS system has onboard SD card for saving device specific data.</a:t>
+            </a:r>
+          </a:p>
+          <a:p>
+            <a:pPr lvl="0">
+              <a:spcBef>
+                <a:spcPts val="0"/>
+              </a:spcBef>
+              <a:buNone/>
+            </a:pPr>
+            <a:endParaRPr dirty="0"/>
+          </a:p>
+        </p:txBody>
+      </p:sp>
+      <p:sp>
+        <p:nvSpPr>
+          <p:cNvPr id="111" name="Shape 111"/>
+          <p:cNvSpPr/>
+          <p:nvPr/>
+        </p:nvSpPr>
+        <p:spPr>
+          <a:xfrm>
+            <a:off x="4877750" y="2478275"/>
+            <a:ext cx="2557200" cy="2374500"/>
+          </a:xfrm>
+          <a:prstGeom prst="roundRect">
+            <a:avLst>
+              <a:gd name="adj" fmla="val 16667"/>
+            </a:avLst>
+          </a:prstGeom>
+          <a:solidFill>
+            <a:schemeClr val="lt2"/>
+          </a:solidFill>
+          <a:ln w="9525" cap="flat" cmpd="sng">
+            <a:solidFill>
+              <a:schemeClr val="dk2"/>
+            </a:solidFill>
+            <a:prstDash val="solid"/>
+            <a:round/>
+            <a:headEnd type="none" w="med" len="med"/>
+            <a:tailEnd type="none" w="med" len="med"/>
+          </a:ln>
+        </p:spPr>
+        <p:txBody>
+          <a:bodyPr lIns="91425" tIns="91425" rIns="91425" bIns="91425" anchor="ctr" anchorCtr="0">
+            <a:noAutofit/>
+          </a:bodyPr>
+          <a:lstStyle/>
+          <a:p>
+            <a:pPr lvl="0" rtl="0">
+              <a:lnSpc>
+                <a:spcPct val="115000"/>
+              </a:lnSpc>
+              <a:spcBef>
+                <a:spcPts val="0"/>
+              </a:spcBef>
+              <a:buClr>
+                <a:schemeClr val="dk2"/>
+              </a:buClr>
+              <a:buFont typeface="Arial"/>
+              <a:buNone/>
+            </a:pPr>
+            <a:endParaRPr>
+              <a:solidFill>
+                <a:srgbClr val="FF0000"/>
+              </a:solidFill>
+              <a:latin typeface="Playfair Display"/>
+              <a:ea typeface="Playfair Display"/>
+              <a:cs typeface="Playfair Display"/>
+              <a:sym typeface="Playfair Display"/>
+            </a:endParaRPr>
+          </a:p>
+          <a:p>
+            <a:pPr lvl="0" rtl="0">
+              <a:lnSpc>
+                <a:spcPct val="115000"/>
+              </a:lnSpc>
+              <a:spcBef>
+                <a:spcPts val="0"/>
+              </a:spcBef>
+              <a:buClr>
+                <a:schemeClr val="dk2"/>
+              </a:buClr>
+              <a:buFont typeface="Arial"/>
+              <a:buNone/>
+            </a:pPr>
+            <a:r>
+              <a:rPr lang="en" b="1">
+                <a:solidFill>
+                  <a:srgbClr val="1155CC"/>
+                </a:solidFill>
+                <a:latin typeface="Playfair Display"/>
+                <a:ea typeface="Playfair Display"/>
+                <a:cs typeface="Playfair Display"/>
+                <a:sym typeface="Playfair Display"/>
+              </a:rPr>
+              <a:t>#include&lt;stdio.h&gt;</a:t>
+            </a:r>
+          </a:p>
+          <a:p>
+            <a:pPr lvl="0" rtl="0">
+              <a:lnSpc>
+                <a:spcPct val="115000"/>
+              </a:lnSpc>
+              <a:spcBef>
+                <a:spcPts val="0"/>
+              </a:spcBef>
+              <a:buClr>
+                <a:schemeClr val="dk2"/>
+              </a:buClr>
+              <a:buFont typeface="Arial"/>
+              <a:buNone/>
+            </a:pPr>
+            <a:r>
+              <a:rPr lang="en" b="1">
+                <a:solidFill>
+                  <a:srgbClr val="1155CC"/>
+                </a:solidFill>
+                <a:latin typeface="Playfair Display"/>
+                <a:ea typeface="Playfair Display"/>
+                <a:cs typeface="Playfair Display"/>
+                <a:sym typeface="Playfair Display"/>
+              </a:rPr>
+              <a:t>void  main()</a:t>
+            </a:r>
+          </a:p>
+          <a:p>
+            <a:pPr lvl="0" rtl="0">
+              <a:lnSpc>
+                <a:spcPct val="115000"/>
+              </a:lnSpc>
+              <a:spcBef>
+                <a:spcPts val="0"/>
+              </a:spcBef>
+              <a:buClr>
+                <a:schemeClr val="dk2"/>
+              </a:buClr>
+              <a:buFont typeface="Arial"/>
+              <a:buNone/>
+            </a:pPr>
+            <a:r>
+              <a:rPr lang="en" b="1">
+                <a:solidFill>
+                  <a:srgbClr val="1155CC"/>
+                </a:solidFill>
+                <a:latin typeface="Playfair Display"/>
+                <a:ea typeface="Playfair Display"/>
+                <a:cs typeface="Playfair Display"/>
+                <a:sym typeface="Playfair Display"/>
+              </a:rPr>
+              <a:t>{        </a:t>
+            </a:r>
+          </a:p>
+          <a:p>
+            <a:pPr lvl="0" rtl="0">
+              <a:lnSpc>
+                <a:spcPct val="115000"/>
+              </a:lnSpc>
+              <a:spcBef>
+                <a:spcPts val="0"/>
+              </a:spcBef>
+              <a:buNone/>
+            </a:pPr>
+            <a:r>
+              <a:rPr lang="en" b="1">
+                <a:solidFill>
+                  <a:srgbClr val="1155CC"/>
+                </a:solidFill>
+                <a:latin typeface="Playfair Display"/>
+                <a:ea typeface="Playfair Display"/>
+                <a:cs typeface="Playfair Display"/>
+                <a:sym typeface="Playfair Display"/>
+              </a:rPr>
+              <a:t>      led_on(1); </a:t>
+            </a:r>
+          </a:p>
+          <a:p>
+            <a:pPr lvl="0" rtl="0">
+              <a:lnSpc>
+                <a:spcPct val="115000"/>
+              </a:lnSpc>
+              <a:spcBef>
+                <a:spcPts val="0"/>
+              </a:spcBef>
+              <a:buNone/>
+            </a:pPr>
+            <a:r>
+              <a:rPr lang="en" b="1">
+                <a:solidFill>
+                  <a:srgbClr val="1155CC"/>
+                </a:solidFill>
+                <a:latin typeface="Playfair Display"/>
+                <a:ea typeface="Playfair Display"/>
+                <a:cs typeface="Playfair Display"/>
+                <a:sym typeface="Playfair Display"/>
+              </a:rPr>
+              <a:t>      ms_wait(100);</a:t>
+            </a:r>
+          </a:p>
+          <a:p>
+            <a:pPr lvl="0" rtl="0">
+              <a:lnSpc>
+                <a:spcPct val="115000"/>
+              </a:lnSpc>
+              <a:spcBef>
+                <a:spcPts val="0"/>
+              </a:spcBef>
+              <a:buClr>
+                <a:schemeClr val="dk2"/>
+              </a:buClr>
+              <a:buFont typeface="Arial"/>
+              <a:buNone/>
+            </a:pPr>
+            <a:r>
+              <a:rPr lang="en" b="1">
+                <a:solidFill>
+                  <a:srgbClr val="1155CC"/>
+                </a:solidFill>
+                <a:latin typeface="Playfair Display"/>
+                <a:ea typeface="Playfair Display"/>
+                <a:cs typeface="Playfair Display"/>
+                <a:sym typeface="Playfair Display"/>
+              </a:rPr>
+              <a:t>      led_off(1);  </a:t>
+            </a:r>
+          </a:p>
+          <a:p>
+            <a:pPr lvl="0" rtl="0">
+              <a:lnSpc>
+                <a:spcPct val="115000"/>
+              </a:lnSpc>
+              <a:spcBef>
+                <a:spcPts val="0"/>
+              </a:spcBef>
+              <a:buClr>
+                <a:schemeClr val="dk2"/>
+              </a:buClr>
+              <a:buFont typeface="Arial"/>
+              <a:buNone/>
+            </a:pPr>
+            <a:r>
+              <a:rPr lang="en" b="1">
+                <a:solidFill>
+                  <a:srgbClr val="1155CC"/>
+                </a:solidFill>
+                <a:latin typeface="Playfair Display"/>
+                <a:ea typeface="Playfair Display"/>
+                <a:cs typeface="Playfair Display"/>
+                <a:sym typeface="Playfair Display"/>
+              </a:rPr>
+              <a:t>      Return 0;</a:t>
+            </a:r>
+          </a:p>
+          <a:p>
+            <a:pPr lvl="0" rtl="0">
+              <a:lnSpc>
+                <a:spcPct val="115000"/>
+              </a:lnSpc>
+              <a:spcBef>
+                <a:spcPts val="0"/>
+              </a:spcBef>
+              <a:buClr>
+                <a:schemeClr val="dk2"/>
+              </a:buClr>
+              <a:buFont typeface="Arial"/>
+              <a:buNone/>
+            </a:pPr>
+            <a:r>
+              <a:rPr lang="en" b="1">
+                <a:solidFill>
+                  <a:srgbClr val="1155CC"/>
+                </a:solidFill>
+                <a:latin typeface="Playfair Display"/>
+                <a:ea typeface="Playfair Display"/>
+                <a:cs typeface="Playfair Display"/>
+                <a:sym typeface="Playfair Display"/>
+              </a:rPr>
+              <a:t>}</a:t>
+            </a:r>
+          </a:p>
+          <a:p>
+            <a:pPr lvl="0">
+              <a:spcBef>
+                <a:spcPts val="0"/>
+              </a:spcBef>
+              <a:buNone/>
+            </a:pPr>
+            <a:endParaRPr/>
+          </a:p>
+        </p:txBody>
+      </p:sp>
+      <p:sp>
+        <p:nvSpPr>
+          <p:cNvPr id="112" name="Shape 112"/>
+          <p:cNvSpPr txBox="1"/>
+          <p:nvPr/>
+        </p:nvSpPr>
+        <p:spPr>
+          <a:xfrm>
+            <a:off x="1979875" y="2478275"/>
+            <a:ext cx="2520000" cy="2485200"/>
+          </a:xfrm>
+          <a:prstGeom prst="rect">
+            <a:avLst/>
+          </a:prstGeom>
+          <a:noFill/>
+          <a:ln>
+            <a:noFill/>
+          </a:ln>
+        </p:spPr>
+        <p:txBody>
+          <a:bodyPr lIns="91425" tIns="91425" rIns="91425" bIns="91425" anchor="t" anchorCtr="0">
+            <a:noAutofit/>
+          </a:bodyPr>
+          <a:lstStyle/>
+          <a:p>
+            <a:pPr lvl="0" rtl="0">
+              <a:lnSpc>
+                <a:spcPct val="115000"/>
+              </a:lnSpc>
+              <a:spcBef>
+                <a:spcPts val="0"/>
+              </a:spcBef>
+              <a:spcAft>
+                <a:spcPts val="1600"/>
+              </a:spcAft>
+              <a:buClr>
+                <a:schemeClr val="dk2"/>
+              </a:buClr>
+              <a:buSzPct val="61111"/>
+              <a:buFont typeface="Arial"/>
+              <a:buNone/>
+            </a:pPr>
+            <a:r>
+              <a:rPr lang="en" sz="1800" b="1">
+                <a:solidFill>
+                  <a:schemeClr val="dk2"/>
+                </a:solidFill>
+                <a:latin typeface="Playfair Display"/>
+                <a:ea typeface="Playfair Display"/>
+                <a:cs typeface="Playfair Display"/>
+                <a:sym typeface="Playfair Display"/>
+              </a:rPr>
+              <a:t>For example:</a:t>
+            </a:r>
+            <a:r>
+              <a:rPr lang="en" sz="1800">
+                <a:solidFill>
+                  <a:schemeClr val="dk2"/>
+                </a:solidFill>
+                <a:latin typeface="Playfair Display"/>
+                <a:ea typeface="Playfair Display"/>
+                <a:cs typeface="Playfair Display"/>
+                <a:sym typeface="Playfair Display"/>
+              </a:rPr>
+              <a:t> “</a:t>
+            </a:r>
+            <a:r>
+              <a:rPr lang="en" sz="1800" b="1">
+                <a:solidFill>
+                  <a:srgbClr val="CC0000"/>
+                </a:solidFill>
+                <a:latin typeface="Playfair Display"/>
+                <a:ea typeface="Playfair Display"/>
+                <a:cs typeface="Playfair Display"/>
+                <a:sym typeface="Playfair Display"/>
+              </a:rPr>
+              <a:t>autoexec.c”</a:t>
+            </a:r>
+            <a:r>
+              <a:rPr lang="en" sz="1800">
+                <a:solidFill>
+                  <a:schemeClr val="dk2"/>
+                </a:solidFill>
+                <a:latin typeface="Playfair Display"/>
+                <a:ea typeface="Playfair Display"/>
+                <a:cs typeface="Playfair Display"/>
+                <a:sym typeface="Playfair Display"/>
+              </a:rPr>
+              <a:t> file in SD Card(FAT32) will cause LED to be ON for second and then turned OFF.</a:t>
+            </a:r>
+          </a:p>
+          <a:p>
+            <a:pPr lvl="0">
+              <a:spcBef>
+                <a:spcPts val="0"/>
+              </a:spcBef>
+              <a:buNone/>
+            </a:pPr>
+            <a:endParaRPr/>
+          </a:p>
+        </p:txBody>
+      </p:sp>
+    </p:spTree>
+  </p:cSld>
+  <p:clrMapOvr>
+    <a:masterClrMapping/>
+  </p:clrMapOvr>
+  <p:timing>
+    <p:tnLst>
+      <p:par>
+        <p:cTn id="1" dur="indefinite" restart="never" nodeType="tmRoot">
+          <p:childTnLst>
+            <p:seq concurrent="1" nextAc="seek">
+              <p:cTn id="2" dur="indefinite" nodeType="mainSeq">
+                <p:childTnLst>
+                  <p:par>
+                    <p:cTn id="3" fill="hold">
+                      <p:stCondLst>
+                        <p:cond delay="indefinite"/>
+                      </p:stCondLst>
+                      <p:childTnLst>
+                        <p:par>
+                          <p:cTn id="4" fill="hold">
+                            <p:stCondLst>
+                              <p:cond delay="0"/>
+                            </p:stCondLst>
+                            <p:childTnLst>
+                              <p:par>
+                                <p:cTn id="5" presetID="10" presetClass="entr" presetSubtype="0" fill="hold" nodeType="clickEffect">
+                                  <p:stCondLst>
+                                    <p:cond delay="0"/>
+                                  </p:stCondLst>
+                                  <p:childTnLst>
+                                    <p:set>
+                                      <p:cBhvr>
+                                        <p:cTn id="6" dur="1" fill="hold">
+                                          <p:stCondLst>
+                                            <p:cond delay="0"/>
+                                          </p:stCondLst>
+                                        </p:cTn>
+                                        <p:tgtEl>
+                                          <p:spTgt spid="110"/>
+                                        </p:tgtEl>
+                                        <p:attrNameLst>
+                                          <p:attrName>style.visibility</p:attrName>
+                                        </p:attrNameLst>
+                                      </p:cBhvr>
+                                      <p:to>
+                                        <p:strVal val="visible"/>
+                                      </p:to>
+                                    </p:set>
+                                    <p:animEffect transition="in" filter="fade">
+                                      <p:cBhvr>
+                                        <p:cTn id="7" dur="1000"/>
+                                        <p:tgtEl>
+                                          <p:spTgt spid="110"/>
+                                        </p:tgtEl>
+                                      </p:cBhvr>
+                                    </p:animEffect>
+                                  </p:childTnLst>
+                                </p:cTn>
+                              </p:par>
+                            </p:childTnLst>
+                          </p:cTn>
+                        </p:par>
+                      </p:childTnLst>
+                    </p:cTn>
+                  </p:par>
+                </p:childTnLst>
+              </p:cTn>
+              <p:prevCondLst>
+                <p:cond evt="onPrev" delay="0">
+                  <p:tgtEl>
+                    <p:sldTgt/>
+                  </p:tgtEl>
+                </p:cond>
+              </p:prevCondLst>
+              <p:nextCondLst>
+                <p:cond evt="onNext" delay="0">
+                  <p:tgtEl>
+                    <p:sldTgt/>
+                  </p:tgtEl>
+                </p:cond>
+              </p:nextCondLst>
+            </p:seq>
+          </p:childTnLst>
+        </p:cTn>
+      </p:par>
+    </p:tnLst>
+  </p:timing>
+</p:sld>
+</file>
+
+<file path=ppt/slides/slide4.xml><?xml version="1.0" encoding="utf-8"?>
 <p:sld xmlns:a="http://schemas.openxmlformats.org/drawingml/2006/main" xmlns:r="http://schemas.openxmlformats.org/officeDocument/2006/relationships" xmlns:p="http://schemas.openxmlformats.org/presentationml/2006/main">
   <p:cSld>
     <p:spTree>
@@ -23594,7 +23963,7 @@
 </p:sld>
 </file>
 
-<file path=ppt/slides/slide4.xml><?xml version="1.0" encoding="utf-8"?>
+<file path=ppt/slides/slide5.xml><?xml version="1.0" encoding="utf-8"?>
 <p:sld xmlns:a="http://schemas.openxmlformats.org/drawingml/2006/main" xmlns:r="http://schemas.openxmlformats.org/officeDocument/2006/relationships" xmlns:p="http://schemas.openxmlformats.org/presentationml/2006/main">
   <p:cSld>
     <p:spTree>
@@ -24005,7 +24374,7 @@
 </p:sld>
 </file>
 
-<file path=ppt/slides/slide5.xml><?xml version="1.0" encoding="utf-8"?>
+<file path=ppt/slides/slide6.xml><?xml version="1.0" encoding="utf-8"?>
 <p:sld xmlns:a="http://schemas.openxmlformats.org/drawingml/2006/main" xmlns:r="http://schemas.openxmlformats.org/officeDocument/2006/relationships" xmlns:p="http://schemas.openxmlformats.org/presentationml/2006/main">
   <p:cSld>
     <p:spTree>
@@ -24395,7 +24764,7 @@
 </p:sld>
 </file>
 
-<file path=ppt/slides/slide6.xml><?xml version="1.0" encoding="utf-8"?>
+<file path=ppt/slides/slide7.xml><?xml version="1.0" encoding="utf-8"?>
 <p:sld xmlns:a="http://schemas.openxmlformats.org/drawingml/2006/main" xmlns:r="http://schemas.openxmlformats.org/officeDocument/2006/relationships" xmlns:p="http://schemas.openxmlformats.org/presentationml/2006/main">
   <p:cSld>
     <p:spTree>
@@ -25056,7 +25425,7 @@
 </p:sld>
 </file>
 
-<file path=ppt/slides/slide7.xml><?xml version="1.0" encoding="utf-8"?>
+<file path=ppt/slides/slide8.xml><?xml version="1.0" encoding="utf-8"?>
 <p:sld xmlns:a="http://schemas.openxmlformats.org/drawingml/2006/main" xmlns:r="http://schemas.openxmlformats.org/officeDocument/2006/relationships" xmlns:p="http://schemas.openxmlformats.org/presentationml/2006/main">
   <p:cSld>
     <p:spTree>
@@ -25670,7 +26039,7 @@
 </p:sld>
 </file>
 
-<file path=ppt/slides/slide8.xml><?xml version="1.0" encoding="utf-8"?>
+<file path=ppt/slides/slide9.xml><?xml version="1.0" encoding="utf-8"?>
 <p:sld xmlns:a="http://schemas.openxmlformats.org/drawingml/2006/main" xmlns:r="http://schemas.openxmlformats.org/officeDocument/2006/relationships" xmlns:p="http://schemas.openxmlformats.org/presentationml/2006/main">
   <p:cSld>
     <p:spTree>
@@ -25948,321 +26317,6 @@
               <a:rPr lang="en"/>
               <a:t>Close loop automated testing platform.</a:t>
             </a:r>
-          </a:p>
-        </p:txBody>
-      </p:sp>
-    </p:spTree>
-  </p:cSld>
-  <p:clrMapOvr>
-    <a:masterClrMapping/>
-  </p:clrMapOvr>
-</p:sld>
-</file>
-
-<file path=ppt/slides/slide9.xml><?xml version="1.0" encoding="utf-8"?>
-<p:sld xmlns:a="http://schemas.openxmlformats.org/drawingml/2006/main" xmlns:r="http://schemas.openxmlformats.org/officeDocument/2006/relationships" xmlns:p="http://schemas.openxmlformats.org/presentationml/2006/main">
-  <p:cSld>
-    <p:spTree>
-      <p:nvGrpSpPr>
-        <p:cNvPr id="1" name="Shape 169"/>
-        <p:cNvGrpSpPr/>
-        <p:nvPr/>
-      </p:nvGrpSpPr>
-      <p:grpSpPr>
-        <a:xfrm>
-          <a:off x="0" y="0"/>
-          <a:ext cx="0" cy="0"/>
-          <a:chOff x="0" y="0"/>
-          <a:chExt cx="0" cy="0"/>
-        </a:xfrm>
-      </p:grpSpPr>
-      <p:sp>
-        <p:nvSpPr>
-          <p:cNvPr id="170" name="Shape 170"/>
-          <p:cNvSpPr txBox="1">
-            <a:spLocks noGrp="1"/>
-          </p:cNvSpPr>
-          <p:nvPr>
-            <p:ph type="title"/>
-          </p:nvPr>
-        </p:nvSpPr>
-        <p:spPr>
-          <a:xfrm>
-            <a:off x="311700" y="445025"/>
-            <a:ext cx="8520599" cy="572699"/>
-          </a:xfrm>
-          <a:prstGeom prst="rect">
-            <a:avLst/>
-          </a:prstGeom>
-          <a:noFill/>
-          <a:ln>
-            <a:noFill/>
-          </a:ln>
-        </p:spPr>
-        <p:txBody>
-          <a:bodyPr lIns="91425" tIns="91425" rIns="91425" bIns="91425" anchor="t" anchorCtr="0">
-            <a:noAutofit/>
-          </a:bodyPr>
-          <a:lstStyle/>
-          <a:p>
-            <a:pPr marL="0" marR="0" lvl="0" indent="0" algn="ctr" rtl="0">
-              <a:lnSpc>
-                <a:spcPct val="100000"/>
-              </a:lnSpc>
-              <a:spcBef>
-                <a:spcPts val="0"/>
-              </a:spcBef>
-              <a:spcAft>
-                <a:spcPts val="0"/>
-              </a:spcAft>
-              <a:buClr>
-                <a:schemeClr val="dk2"/>
-              </a:buClr>
-              <a:buSzPct val="25000"/>
-              <a:buFont typeface="Oswald"/>
-              <a:buNone/>
-            </a:pPr>
-            <a:r>
-              <a:rPr lang="en">
-                <a:solidFill>
-                  <a:srgbClr val="4A86E8"/>
-                </a:solidFill>
-              </a:rPr>
-              <a:t>Reuse Raspberry PI2 Enclosure</a:t>
-            </a:r>
-          </a:p>
-          <a:p>
-            <a:pPr marL="0" marR="0" lvl="0" indent="0" algn="ctr" rtl="0">
-              <a:lnSpc>
-                <a:spcPct val="100000"/>
-              </a:lnSpc>
-              <a:spcBef>
-                <a:spcPts val="0"/>
-              </a:spcBef>
-              <a:spcAft>
-                <a:spcPts val="0"/>
-              </a:spcAft>
-              <a:buClr>
-                <a:schemeClr val="dk2"/>
-              </a:buClr>
-              <a:buSzPct val="25000"/>
-              <a:buFont typeface="Oswald"/>
-              <a:buNone/>
-            </a:pPr>
-            <a:endParaRPr sz="3000" b="0" i="0" u="none" strike="noStrike" cap="none">
-              <a:solidFill>
-                <a:schemeClr val="dk2"/>
-              </a:solidFill>
-              <a:latin typeface="Oswald"/>
-              <a:ea typeface="Oswald"/>
-              <a:cs typeface="Oswald"/>
-              <a:sym typeface="Oswald"/>
-            </a:endParaRPr>
-          </a:p>
-        </p:txBody>
-      </p:sp>
-      <p:sp>
-        <p:nvSpPr>
-          <p:cNvPr id="171" name="Shape 171"/>
-          <p:cNvSpPr txBox="1">
-            <a:spLocks noGrp="1"/>
-          </p:cNvSpPr>
-          <p:nvPr>
-            <p:ph type="body" idx="1"/>
-          </p:nvPr>
-        </p:nvSpPr>
-        <p:spPr>
-          <a:xfrm>
-            <a:off x="311700" y="1017725"/>
-            <a:ext cx="8520600" cy="4060200"/>
-          </a:xfrm>
-          <a:prstGeom prst="rect">
-            <a:avLst/>
-          </a:prstGeom>
-          <a:noFill/>
-          <a:ln>
-            <a:noFill/>
-          </a:ln>
-        </p:spPr>
-        <p:txBody>
-          <a:bodyPr lIns="91425" tIns="91425" rIns="91425" bIns="91425" anchor="t" anchorCtr="0">
-            <a:noAutofit/>
-          </a:bodyPr>
-          <a:lstStyle/>
-          <a:p>
-            <a:pPr marL="457200" marR="0" lvl="0" indent="-228600" algn="l" rtl="0">
-              <a:lnSpc>
-                <a:spcPct val="115000"/>
-              </a:lnSpc>
-              <a:spcBef>
-                <a:spcPts val="0"/>
-              </a:spcBef>
-              <a:spcAft>
-                <a:spcPts val="0"/>
-              </a:spcAft>
-              <a:buClr>
-                <a:schemeClr val="dk2"/>
-              </a:buClr>
-              <a:buSzPct val="100000"/>
-              <a:buFont typeface="Playfair Display"/>
-              <a:buAutoNum type="alphaUcPeriod"/>
-            </a:pPr>
-            <a:r>
-              <a:rPr lang="en"/>
-              <a:t> Credit card size board just like raspberry PI, it may be accommodated in raspberry PI enclosure.</a:t>
-            </a:r>
-          </a:p>
-        </p:txBody>
-      </p:sp>
-      <p:pic>
-        <p:nvPicPr>
-          <p:cNvPr id="172" name="Shape 172" descr="board1.jpg"/>
-          <p:cNvPicPr preferRelativeResize="0"/>
-          <p:nvPr/>
-        </p:nvPicPr>
-        <p:blipFill>
-          <a:blip r:embed="rId3">
-            <a:alphaModFix/>
-          </a:blip>
-          <a:stretch>
-            <a:fillRect/>
-          </a:stretch>
-        </p:blipFill>
-        <p:spPr>
-          <a:xfrm>
-            <a:off x="543850" y="1753749"/>
-            <a:ext cx="4764303" cy="3158700"/>
-          </a:xfrm>
-          <a:prstGeom prst="rect">
-            <a:avLst/>
-          </a:prstGeom>
-          <a:noFill/>
-          <a:ln w="19050" cap="flat" cmpd="sng">
-            <a:solidFill>
-              <a:schemeClr val="dk2"/>
-            </a:solidFill>
-            <a:prstDash val="solid"/>
-            <a:round/>
-            <a:headEnd type="none" w="med" len="med"/>
-            <a:tailEnd type="none" w="med" len="med"/>
-          </a:ln>
-        </p:spPr>
-      </p:pic>
-      <p:pic>
-        <p:nvPicPr>
-          <p:cNvPr id="173" name="Shape 173" descr="board2.jpg"/>
-          <p:cNvPicPr preferRelativeResize="0"/>
-          <p:nvPr/>
-        </p:nvPicPr>
-        <p:blipFill>
-          <a:blip r:embed="rId4">
-            <a:alphaModFix/>
-          </a:blip>
-          <a:stretch>
-            <a:fillRect/>
-          </a:stretch>
-        </p:blipFill>
-        <p:spPr>
-          <a:xfrm>
-            <a:off x="5956575" y="1753750"/>
-            <a:ext cx="2596522" cy="1250624"/>
-          </a:xfrm>
-          <a:prstGeom prst="rect">
-            <a:avLst/>
-          </a:prstGeom>
-          <a:noFill/>
-          <a:ln w="19050" cap="flat" cmpd="sng">
-            <a:solidFill>
-              <a:schemeClr val="dk2"/>
-            </a:solidFill>
-            <a:prstDash val="solid"/>
-            <a:round/>
-            <a:headEnd type="none" w="med" len="med"/>
-            <a:tailEnd type="none" w="med" len="med"/>
-          </a:ln>
-        </p:spPr>
-      </p:pic>
-      <p:sp>
-        <p:nvSpPr>
-          <p:cNvPr id="174" name="Shape 174"/>
-          <p:cNvSpPr txBox="1"/>
-          <p:nvPr/>
-        </p:nvSpPr>
-        <p:spPr>
-          <a:xfrm>
-            <a:off x="6503762" y="4339750"/>
-            <a:ext cx="1751400" cy="572700"/>
-          </a:xfrm>
-          <a:prstGeom prst="rect">
-            <a:avLst/>
-          </a:prstGeom>
-          <a:noFill/>
-          <a:ln>
-            <a:noFill/>
-          </a:ln>
-        </p:spPr>
-        <p:txBody>
-          <a:bodyPr lIns="91425" tIns="91425" rIns="91425" bIns="91425" anchor="t" anchorCtr="0">
-            <a:noAutofit/>
-          </a:bodyPr>
-          <a:lstStyle/>
-          <a:p>
-            <a:pPr lvl="0">
-              <a:spcBef>
-                <a:spcPts val="0"/>
-              </a:spcBef>
-              <a:buNone/>
-            </a:pPr>
-            <a:r>
-              <a:rPr lang="en"/>
-              <a:t>Similar size as Raspberry PI 2/3</a:t>
-            </a:r>
-          </a:p>
-        </p:txBody>
-      </p:sp>
-      <p:sp>
-        <p:nvSpPr>
-          <p:cNvPr id="175" name="Shape 175"/>
-          <p:cNvSpPr/>
-          <p:nvPr/>
-        </p:nvSpPr>
-        <p:spPr>
-          <a:xfrm>
-            <a:off x="7110987" y="3454375"/>
-            <a:ext cx="287700" cy="818700"/>
-          </a:xfrm>
-          <a:prstGeom prst="upArrow">
-            <a:avLst>
-              <a:gd name="adj1" fmla="val 50000"/>
-              <a:gd name="adj2" fmla="val 50000"/>
-            </a:avLst>
-          </a:prstGeom>
-          <a:solidFill>
-            <a:schemeClr val="lt2"/>
-          </a:solidFill>
-          <a:ln w="9525" cap="flat" cmpd="sng">
-            <a:solidFill>
-              <a:schemeClr val="dk2"/>
-            </a:solidFill>
-            <a:prstDash val="solid"/>
-            <a:round/>
-            <a:headEnd type="none" w="med" len="med"/>
-            <a:tailEnd type="none" w="med" len="med"/>
-          </a:ln>
-        </p:spPr>
-        <p:txBody>
-          <a:bodyPr lIns="91425" tIns="91425" rIns="91425" bIns="91425" anchor="ctr" anchorCtr="0">
-            <a:noAutofit/>
-          </a:bodyPr>
-          <a:lstStyle/>
-          <a:p>
-            <a:pPr lvl="0">
-              <a:spcBef>
-                <a:spcPts val="0"/>
-              </a:spcBef>
-              <a:buNone/>
-            </a:pPr>
-            <a:endParaRPr/>
           </a:p>
         </p:txBody>
       </p:sp>

</xml_diff>

<commit_message>
Addition in docs/Small Task Computer.pptx
</commit_message>
<xml_diff>
--- a/docs/Small Task Computer.pptx
+++ b/docs/Small Task Computer.pptx
@@ -38,12 +38,12 @@
   <p:notesSz cx="6858000" cy="9144000"/>
   <p:embeddedFontLst>
     <p:embeddedFont>
-      <p:font typeface="Oswald" panose="020B0604020202020204" charset="0"/>
+      <p:font typeface="Montserrat" panose="020B0604020202020204" charset="0"/>
       <p:regular r:id="rId28"/>
       <p:bold r:id="rId29"/>
     </p:embeddedFont>
     <p:embeddedFont>
-      <p:font typeface="Montserrat" panose="020B0604020202020204" charset="0"/>
+      <p:font typeface="Oswald" panose="020B0604020202020204" charset="0"/>
       <p:regular r:id="rId30"/>
       <p:bold r:id="rId31"/>
     </p:embeddedFont>
@@ -19918,11 +19918,6 @@
               </a:rPr>
               <a:t>Open source GUI https://github.com/vijayandra/logger_v1</a:t>
             </a:r>
-            <a:endParaRPr lang="en-US" sz="2400" dirty="0">
-              <a:solidFill>
-                <a:srgbClr val="00B0F0"/>
-              </a:solidFill>
-            </a:endParaRPr>
           </a:p>
         </p:txBody>
       </p:sp>
@@ -19964,7 +19959,47 @@
                   <a:srgbClr val="C00000"/>
                 </a:solidFill>
               </a:rPr>
-              <a:t>Modify according to need and plan to start and support for </a:t>
+              <a:t>Modify according to </a:t>
+            </a:r>
+            <a:r>
+              <a:rPr lang="en-US" sz="1400" dirty="0" smtClean="0">
+                <a:solidFill>
+                  <a:srgbClr val="C00000"/>
+                </a:solidFill>
+              </a:rPr>
+              <a:t>users own need, we anticipate to start and </a:t>
+            </a:r>
+            <a:r>
+              <a:rPr lang="en-US" sz="1400" dirty="0" smtClean="0">
+                <a:solidFill>
+                  <a:srgbClr val="C00000"/>
+                </a:solidFill>
+              </a:rPr>
+              <a:t>support for </a:t>
+            </a:r>
+            <a:r>
+              <a:rPr lang="en-US" sz="1400" dirty="0" smtClean="0">
+                <a:solidFill>
+                  <a:srgbClr val="C00000"/>
+                </a:solidFill>
+              </a:rPr>
+              <a:t>open </a:t>
+            </a:r>
+            <a:r>
+              <a:rPr lang="en-US" sz="1400" dirty="0" smtClean="0">
+                <a:solidFill>
+                  <a:srgbClr val="C00000"/>
+                </a:solidFill>
+              </a:rPr>
+              <a:t>source </a:t>
+            </a:r>
+            <a:r>
+              <a:rPr lang="en-US" sz="1400" dirty="0" smtClean="0">
+                <a:solidFill>
+                  <a:srgbClr val="C00000"/>
+                </a:solidFill>
+              </a:rPr>
+              <a:t>Android/MAC application. We encourage user to write own application. You will need </a:t>
             </a:r>
             <a:r>
               <a:rPr lang="en-US" sz="1400" dirty="0" err="1" smtClean="0">
@@ -19972,7 +20007,7 @@
                   <a:srgbClr val="C00000"/>
                 </a:solidFill>
               </a:rPr>
-              <a:t>for</a:t>
+              <a:t>Qt</a:t>
             </a:r>
             <a:r>
               <a:rPr lang="en-US" sz="1400" dirty="0" smtClean="0">
@@ -19980,7 +20015,23 @@
                   <a:srgbClr val="C00000"/>
                 </a:solidFill>
               </a:rPr>
-              <a:t> creating open source Android/MAC </a:t>
+              <a:t> and </a:t>
+            </a:r>
+            <a:r>
+              <a:rPr lang="en-US" sz="1400" dirty="0" err="1" smtClean="0">
+                <a:solidFill>
+                  <a:srgbClr val="C00000"/>
+                </a:solidFill>
+              </a:rPr>
+              <a:t>CoAP</a:t>
+            </a:r>
+            <a:r>
+              <a:rPr lang="en-US" sz="1400" smtClean="0">
+                <a:solidFill>
+                  <a:srgbClr val="C00000"/>
+                </a:solidFill>
+              </a:rPr>
+              <a:t> framework. </a:t>
             </a:r>
             <a:endParaRPr lang="en-US" sz="1400" dirty="0">
               <a:solidFill>

</xml_diff>